<commit_message>
* Fixed C# BusDepot messages * Fixed busdepotname DB queue -> q * Updated process images * Updated pptx + Added additional JMS connection palette
</commit_message>
<xml_diff>
--- a/EI Presentation.pptx
+++ b/EI Presentation.pptx
@@ -5,13 +5,16 @@
     <p:sldMasterId id="2147483672" r:id="rId1"/>
   </p:sldMasterIdLst>
   <p:notesMasterIdLst>
-    <p:notesMasterId r:id="rId6"/>
+    <p:notesMasterId r:id="rId9"/>
   </p:notesMasterIdLst>
   <p:sldIdLst>
     <p:sldId id="258" r:id="rId2"/>
     <p:sldId id="259" r:id="rId3"/>
     <p:sldId id="257" r:id="rId4"/>
-    <p:sldId id="261" r:id="rId5"/>
+    <p:sldId id="262" r:id="rId5"/>
+    <p:sldId id="263" r:id="rId6"/>
+    <p:sldId id="264" r:id="rId7"/>
+    <p:sldId id="261" r:id="rId8"/>
   </p:sldIdLst>
   <p:sldSz cx="12192000" cy="6858000"/>
   <p:notesSz cx="6858000" cy="9144000"/>
@@ -1106,7 +1109,7 @@
           <a:p>
             <a:fld id="{2969D29A-BED7-4F52-827A-C7D8A439955D}" type="datetimeFigureOut">
               <a:rPr lang="en-US" smtClean="0"/>
-              <a:t>27-Mar-18</a:t>
+              <a:t>3/27/2018</a:t>
             </a:fld>
             <a:endParaRPr lang="en-US"/>
           </a:p>
@@ -1604,7 +1607,7 @@
           <a:p>
             <a:fld id="{4C7F959B-C76D-4575-9470-CE5E6063DE88}" type="datetimeFigureOut">
               <a:rPr lang="en-US" smtClean="0"/>
-              <a:t>27-Mar-18</a:t>
+              <a:t>3/27/2018</a:t>
             </a:fld>
             <a:endParaRPr lang="en-US"/>
           </a:p>
@@ -1802,7 +1805,7 @@
           <a:p>
             <a:fld id="{4C7F959B-C76D-4575-9470-CE5E6063DE88}" type="datetimeFigureOut">
               <a:rPr lang="en-US" smtClean="0"/>
-              <a:t>27-Mar-18</a:t>
+              <a:t>3/27/2018</a:t>
             </a:fld>
             <a:endParaRPr lang="en-US"/>
           </a:p>
@@ -2010,7 +2013,7 @@
           <a:p>
             <a:fld id="{4C7F959B-C76D-4575-9470-CE5E6063DE88}" type="datetimeFigureOut">
               <a:rPr lang="en-US" smtClean="0"/>
-              <a:t>27-Mar-18</a:t>
+              <a:t>3/27/2018</a:t>
             </a:fld>
             <a:endParaRPr lang="en-US"/>
           </a:p>
@@ -2208,7 +2211,7 @@
           <a:p>
             <a:fld id="{4C7F959B-C76D-4575-9470-CE5E6063DE88}" type="datetimeFigureOut">
               <a:rPr lang="en-US" smtClean="0"/>
-              <a:t>27-Mar-18</a:t>
+              <a:t>3/27/2018</a:t>
             </a:fld>
             <a:endParaRPr lang="en-US"/>
           </a:p>
@@ -2483,7 +2486,7 @@
           <a:p>
             <a:fld id="{4C7F959B-C76D-4575-9470-CE5E6063DE88}" type="datetimeFigureOut">
               <a:rPr lang="en-US" smtClean="0"/>
-              <a:t>27-Mar-18</a:t>
+              <a:t>3/27/2018</a:t>
             </a:fld>
             <a:endParaRPr lang="en-US"/>
           </a:p>
@@ -2748,7 +2751,7 @@
           <a:p>
             <a:fld id="{4C7F959B-C76D-4575-9470-CE5E6063DE88}" type="datetimeFigureOut">
               <a:rPr lang="en-US" smtClean="0"/>
-              <a:t>27-Mar-18</a:t>
+              <a:t>3/27/2018</a:t>
             </a:fld>
             <a:endParaRPr lang="en-US"/>
           </a:p>
@@ -3160,7 +3163,7 @@
           <a:p>
             <a:fld id="{4C7F959B-C76D-4575-9470-CE5E6063DE88}" type="datetimeFigureOut">
               <a:rPr lang="en-US" smtClean="0"/>
-              <a:t>27-Mar-18</a:t>
+              <a:t>3/27/2018</a:t>
             </a:fld>
             <a:endParaRPr lang="en-US"/>
           </a:p>
@@ -3301,7 +3304,7 @@
           <a:p>
             <a:fld id="{4C7F959B-C76D-4575-9470-CE5E6063DE88}" type="datetimeFigureOut">
               <a:rPr lang="en-US" smtClean="0"/>
-              <a:t>27-Mar-18</a:t>
+              <a:t>3/27/2018</a:t>
             </a:fld>
             <a:endParaRPr lang="en-US"/>
           </a:p>
@@ -3414,7 +3417,7 @@
           <a:p>
             <a:fld id="{4C7F959B-C76D-4575-9470-CE5E6063DE88}" type="datetimeFigureOut">
               <a:rPr lang="en-US" smtClean="0"/>
-              <a:t>27-Mar-18</a:t>
+              <a:t>3/27/2018</a:t>
             </a:fld>
             <a:endParaRPr lang="en-US"/>
           </a:p>
@@ -3725,7 +3728,7 @@
           <a:p>
             <a:fld id="{4C7F959B-C76D-4575-9470-CE5E6063DE88}" type="datetimeFigureOut">
               <a:rPr lang="en-US" smtClean="0"/>
-              <a:t>27-Mar-18</a:t>
+              <a:t>3/27/2018</a:t>
             </a:fld>
             <a:endParaRPr lang="en-US"/>
           </a:p>
@@ -4013,7 +4016,7 @@
           <a:p>
             <a:fld id="{4C7F959B-C76D-4575-9470-CE5E6063DE88}" type="datetimeFigureOut">
               <a:rPr lang="en-US" smtClean="0"/>
-              <a:t>27-Mar-18</a:t>
+              <a:t>3/27/2018</a:t>
             </a:fld>
             <a:endParaRPr lang="en-US"/>
           </a:p>
@@ -4264,7 +4267,7 @@
           <a:p>
             <a:fld id="{4C7F959B-C76D-4575-9470-CE5E6063DE88}" type="datetimeFigureOut">
               <a:rPr lang="en-US" smtClean="0"/>
-              <a:t>27-Mar-18</a:t>
+              <a:t>3/27/2018</a:t>
             </a:fld>
             <a:endParaRPr lang="en-US"/>
           </a:p>
@@ -8557,6 +8560,225 @@
 </file>
 
 <file path=ppt/slides/slide4.xml><?xml version="1.0" encoding="utf-8"?>
+<p:sld xmlns:a="http://schemas.openxmlformats.org/drawingml/2006/main" xmlns:r="http://schemas.openxmlformats.org/officeDocument/2006/relationships" xmlns:p="http://schemas.openxmlformats.org/presentationml/2006/main">
+  <p:cSld>
+    <p:bg>
+      <p:bgPr>
+        <a:solidFill>
+          <a:schemeClr val="bg1"/>
+        </a:solidFill>
+        <a:effectLst/>
+      </p:bgPr>
+    </p:bg>
+    <p:spTree>
+      <p:nvGrpSpPr>
+        <p:cNvPr id="1" name=""/>
+        <p:cNvGrpSpPr/>
+        <p:nvPr/>
+      </p:nvGrpSpPr>
+      <p:grpSpPr>
+        <a:xfrm>
+          <a:off x="0" y="0"/>
+          <a:ext cx="0" cy="0"/>
+          <a:chOff x="0" y="0"/>
+          <a:chExt cx="0" cy="0"/>
+        </a:xfrm>
+      </p:grpSpPr>
+      <p:pic>
+        <p:nvPicPr>
+          <p:cNvPr id="3" name="Picture 2">
+            <a:extLst>
+              <a:ext uri="{FF2B5EF4-FFF2-40B4-BE49-F238E27FC236}">
+                <a16:creationId xmlns:a16="http://schemas.microsoft.com/office/drawing/2014/main" id="{A66B5C86-1400-4130-9803-610C497DDDAE}"/>
+              </a:ext>
+            </a:extLst>
+          </p:cNvPr>
+          <p:cNvPicPr>
+            <a:picLocks noChangeAspect="1"/>
+          </p:cNvPicPr>
+          <p:nvPr/>
+        </p:nvPicPr>
+        <p:blipFill rotWithShape="1">
+          <a:blip r:embed="rId2">
+            <a:extLst>
+              <a:ext uri="{28A0092B-C50C-407E-A947-70E740481C1C}">
+                <a14:useLocalDpi xmlns:a14="http://schemas.microsoft.com/office/drawing/2010/main" val="0"/>
+              </a:ext>
+            </a:extLst>
+          </a:blip>
+          <a:srcRect l="7537" b="59619"/>
+          <a:stretch/>
+        </p:blipFill>
+        <p:spPr>
+          <a:xfrm>
+            <a:off x="5708" y="1854925"/>
+            <a:ext cx="12152599" cy="3226526"/>
+          </a:xfrm>
+          <a:prstGeom prst="rect">
+            <a:avLst/>
+          </a:prstGeom>
+        </p:spPr>
+      </p:pic>
+    </p:spTree>
+    <p:extLst>
+      <p:ext uri="{BB962C8B-B14F-4D97-AF65-F5344CB8AC3E}">
+        <p14:creationId xmlns:p14="http://schemas.microsoft.com/office/powerpoint/2010/main" val="4025788133"/>
+      </p:ext>
+    </p:extLst>
+  </p:cSld>
+  <p:clrMapOvr>
+    <a:masterClrMapping/>
+  </p:clrMapOvr>
+</p:sld>
+</file>
+
+<file path=ppt/slides/slide5.xml><?xml version="1.0" encoding="utf-8"?>
+<p:sld xmlns:a="http://schemas.openxmlformats.org/drawingml/2006/main" xmlns:r="http://schemas.openxmlformats.org/officeDocument/2006/relationships" xmlns:p="http://schemas.openxmlformats.org/presentationml/2006/main">
+  <p:cSld>
+    <p:bg>
+      <p:bgPr>
+        <a:solidFill>
+          <a:schemeClr val="bg1"/>
+        </a:solidFill>
+        <a:effectLst/>
+      </p:bgPr>
+    </p:bg>
+    <p:spTree>
+      <p:nvGrpSpPr>
+        <p:cNvPr id="1" name=""/>
+        <p:cNvGrpSpPr/>
+        <p:nvPr/>
+      </p:nvGrpSpPr>
+      <p:grpSpPr>
+        <a:xfrm>
+          <a:off x="0" y="0"/>
+          <a:ext cx="0" cy="0"/>
+          <a:chOff x="0" y="0"/>
+          <a:chExt cx="0" cy="0"/>
+        </a:xfrm>
+      </p:grpSpPr>
+      <p:pic>
+        <p:nvPicPr>
+          <p:cNvPr id="4" name="Picture 3">
+            <a:extLst>
+              <a:ext uri="{FF2B5EF4-FFF2-40B4-BE49-F238E27FC236}">
+                <a16:creationId xmlns:a16="http://schemas.microsoft.com/office/drawing/2014/main" id="{27B01D72-CD1C-4BAF-8AF5-856A0A6AA8B2}"/>
+              </a:ext>
+            </a:extLst>
+          </p:cNvPr>
+          <p:cNvPicPr>
+            <a:picLocks noChangeAspect="1"/>
+          </p:cNvPicPr>
+          <p:nvPr/>
+        </p:nvPicPr>
+        <p:blipFill rotWithShape="1">
+          <a:blip r:embed="rId2">
+            <a:extLst>
+              <a:ext uri="{28A0092B-C50C-407E-A947-70E740481C1C}">
+                <a14:useLocalDpi xmlns:a14="http://schemas.microsoft.com/office/drawing/2010/main" val="0"/>
+              </a:ext>
+            </a:extLst>
+          </a:blip>
+          <a:srcRect r="35929" b="51581"/>
+          <a:stretch/>
+        </p:blipFill>
+        <p:spPr>
+          <a:xfrm>
+            <a:off x="0" y="696914"/>
+            <a:ext cx="12199562" cy="4684983"/>
+          </a:xfrm>
+          <a:prstGeom prst="rect">
+            <a:avLst/>
+          </a:prstGeom>
+        </p:spPr>
+      </p:pic>
+    </p:spTree>
+    <p:extLst>
+      <p:ext uri="{BB962C8B-B14F-4D97-AF65-F5344CB8AC3E}">
+        <p14:creationId xmlns:p14="http://schemas.microsoft.com/office/powerpoint/2010/main" val="2659706075"/>
+      </p:ext>
+    </p:extLst>
+  </p:cSld>
+  <p:clrMapOvr>
+    <a:masterClrMapping/>
+  </p:clrMapOvr>
+</p:sld>
+</file>
+
+<file path=ppt/slides/slide6.xml><?xml version="1.0" encoding="utf-8"?>
+<p:sld xmlns:a="http://schemas.openxmlformats.org/drawingml/2006/main" xmlns:r="http://schemas.openxmlformats.org/officeDocument/2006/relationships" xmlns:p="http://schemas.openxmlformats.org/presentationml/2006/main">
+  <p:cSld>
+    <p:bg>
+      <p:bgPr>
+        <a:solidFill>
+          <a:schemeClr val="bg1"/>
+        </a:solidFill>
+        <a:effectLst/>
+      </p:bgPr>
+    </p:bg>
+    <p:spTree>
+      <p:nvGrpSpPr>
+        <p:cNvPr id="1" name=""/>
+        <p:cNvGrpSpPr/>
+        <p:nvPr/>
+      </p:nvGrpSpPr>
+      <p:grpSpPr>
+        <a:xfrm>
+          <a:off x="0" y="0"/>
+          <a:ext cx="0" cy="0"/>
+          <a:chOff x="0" y="0"/>
+          <a:chExt cx="0" cy="0"/>
+        </a:xfrm>
+      </p:grpSpPr>
+      <p:pic>
+        <p:nvPicPr>
+          <p:cNvPr id="4" name="Picture 3">
+            <a:extLst>
+              <a:ext uri="{FF2B5EF4-FFF2-40B4-BE49-F238E27FC236}">
+                <a16:creationId xmlns:a16="http://schemas.microsoft.com/office/drawing/2014/main" id="{5A1A8560-3EE8-43B3-80F1-3ACBE062F36C}"/>
+              </a:ext>
+            </a:extLst>
+          </p:cNvPr>
+          <p:cNvPicPr>
+            <a:picLocks noChangeAspect="1"/>
+          </p:cNvPicPr>
+          <p:nvPr/>
+        </p:nvPicPr>
+        <p:blipFill rotWithShape="1">
+          <a:blip r:embed="rId2">
+            <a:extLst>
+              <a:ext uri="{28A0092B-C50C-407E-A947-70E740481C1C}">
+                <a14:useLocalDpi xmlns:a14="http://schemas.microsoft.com/office/drawing/2010/main" val="0"/>
+              </a:ext>
+            </a:extLst>
+          </a:blip>
+          <a:srcRect r="57654" b="56528"/>
+          <a:stretch/>
+        </p:blipFill>
+        <p:spPr>
+          <a:xfrm>
+            <a:off x="0" y="331154"/>
+            <a:ext cx="12192000" cy="6360436"/>
+          </a:xfrm>
+          <a:prstGeom prst="rect">
+            <a:avLst/>
+          </a:prstGeom>
+        </p:spPr>
+      </p:pic>
+    </p:spTree>
+    <p:extLst>
+      <p:ext uri="{BB962C8B-B14F-4D97-AF65-F5344CB8AC3E}">
+        <p14:creationId xmlns:p14="http://schemas.microsoft.com/office/powerpoint/2010/main" val="1510290143"/>
+      </p:ext>
+    </p:extLst>
+  </p:cSld>
+  <p:clrMapOvr>
+    <a:masterClrMapping/>
+  </p:clrMapOvr>
+</p:sld>
+</file>
+
+<file path=ppt/slides/slide7.xml><?xml version="1.0" encoding="utf-8"?>
 <p:sld xmlns:a="http://schemas.openxmlformats.org/drawingml/2006/main" xmlns:r="http://schemas.openxmlformats.org/officeDocument/2006/relationships" xmlns:p="http://schemas.openxmlformats.org/presentationml/2006/main">
   <p:cSld>
     <p:bg>

</xml_diff>

<commit_message>
+ Copy and pasted EI Report from Cloud to Git, Minor changes to EI Presentation, Updated Schedule Polling Image
~ Copy and pasted EI Report from Cloud to Git
~Minor changes to EI Presentation
`Updated Schedule Polling Image
</commit_message>
<xml_diff>
--- a/EI Presentation.pptx
+++ b/EI Presentation.pptx
@@ -9,8 +9,8 @@
   </p:notesMasterIdLst>
   <p:sldIdLst>
     <p:sldId id="258" r:id="rId2"/>
-    <p:sldId id="259" r:id="rId3"/>
-    <p:sldId id="263" r:id="rId4"/>
+    <p:sldId id="263" r:id="rId3"/>
+    <p:sldId id="259" r:id="rId4"/>
     <p:sldId id="257" r:id="rId5"/>
     <p:sldId id="261" r:id="rId6"/>
   </p:sldIdLst>
@@ -1107,7 +1107,7 @@
           <a:p>
             <a:fld id="{2969D29A-BED7-4F52-827A-C7D8A439955D}" type="datetimeFigureOut">
               <a:rPr lang="en-US" smtClean="0"/>
-              <a:t>3/27/2018</a:t>
+              <a:t>27-Mar-18</a:t>
             </a:fld>
             <a:endParaRPr lang="en-US"/>
           </a:p>
@@ -1605,7 +1605,7 @@
           <a:p>
             <a:fld id="{4C7F959B-C76D-4575-9470-CE5E6063DE88}" type="datetimeFigureOut">
               <a:rPr lang="en-US" smtClean="0"/>
-              <a:t>3/27/2018</a:t>
+              <a:t>27-Mar-18</a:t>
             </a:fld>
             <a:endParaRPr lang="en-US"/>
           </a:p>
@@ -1803,7 +1803,7 @@
           <a:p>
             <a:fld id="{4C7F959B-C76D-4575-9470-CE5E6063DE88}" type="datetimeFigureOut">
               <a:rPr lang="en-US" smtClean="0"/>
-              <a:t>3/27/2018</a:t>
+              <a:t>27-Mar-18</a:t>
             </a:fld>
             <a:endParaRPr lang="en-US"/>
           </a:p>
@@ -2011,7 +2011,7 @@
           <a:p>
             <a:fld id="{4C7F959B-C76D-4575-9470-CE5E6063DE88}" type="datetimeFigureOut">
               <a:rPr lang="en-US" smtClean="0"/>
-              <a:t>3/27/2018</a:t>
+              <a:t>27-Mar-18</a:t>
             </a:fld>
             <a:endParaRPr lang="en-US"/>
           </a:p>
@@ -2209,7 +2209,7 @@
           <a:p>
             <a:fld id="{4C7F959B-C76D-4575-9470-CE5E6063DE88}" type="datetimeFigureOut">
               <a:rPr lang="en-US" smtClean="0"/>
-              <a:t>3/27/2018</a:t>
+              <a:t>27-Mar-18</a:t>
             </a:fld>
             <a:endParaRPr lang="en-US"/>
           </a:p>
@@ -2484,7 +2484,7 @@
           <a:p>
             <a:fld id="{4C7F959B-C76D-4575-9470-CE5E6063DE88}" type="datetimeFigureOut">
               <a:rPr lang="en-US" smtClean="0"/>
-              <a:t>3/27/2018</a:t>
+              <a:t>27-Mar-18</a:t>
             </a:fld>
             <a:endParaRPr lang="en-US"/>
           </a:p>
@@ -2749,7 +2749,7 @@
           <a:p>
             <a:fld id="{4C7F959B-C76D-4575-9470-CE5E6063DE88}" type="datetimeFigureOut">
               <a:rPr lang="en-US" smtClean="0"/>
-              <a:t>3/27/2018</a:t>
+              <a:t>27-Mar-18</a:t>
             </a:fld>
             <a:endParaRPr lang="en-US"/>
           </a:p>
@@ -3161,7 +3161,7 @@
           <a:p>
             <a:fld id="{4C7F959B-C76D-4575-9470-CE5E6063DE88}" type="datetimeFigureOut">
               <a:rPr lang="en-US" smtClean="0"/>
-              <a:t>3/27/2018</a:t>
+              <a:t>27-Mar-18</a:t>
             </a:fld>
             <a:endParaRPr lang="en-US"/>
           </a:p>
@@ -3302,7 +3302,7 @@
           <a:p>
             <a:fld id="{4C7F959B-C76D-4575-9470-CE5E6063DE88}" type="datetimeFigureOut">
               <a:rPr lang="en-US" smtClean="0"/>
-              <a:t>3/27/2018</a:t>
+              <a:t>27-Mar-18</a:t>
             </a:fld>
             <a:endParaRPr lang="en-US"/>
           </a:p>
@@ -3415,7 +3415,7 @@
           <a:p>
             <a:fld id="{4C7F959B-C76D-4575-9470-CE5E6063DE88}" type="datetimeFigureOut">
               <a:rPr lang="en-US" smtClean="0"/>
-              <a:t>3/27/2018</a:t>
+              <a:t>27-Mar-18</a:t>
             </a:fld>
             <a:endParaRPr lang="en-US"/>
           </a:p>
@@ -3726,7 +3726,7 @@
           <a:p>
             <a:fld id="{4C7F959B-C76D-4575-9470-CE5E6063DE88}" type="datetimeFigureOut">
               <a:rPr lang="en-US" smtClean="0"/>
-              <a:t>3/27/2018</a:t>
+              <a:t>27-Mar-18</a:t>
             </a:fld>
             <a:endParaRPr lang="en-US"/>
           </a:p>
@@ -4014,7 +4014,7 @@
           <a:p>
             <a:fld id="{4C7F959B-C76D-4575-9470-CE5E6063DE88}" type="datetimeFigureOut">
               <a:rPr lang="en-US" smtClean="0"/>
-              <a:t>3/27/2018</a:t>
+              <a:t>27-Mar-18</a:t>
             </a:fld>
             <a:endParaRPr lang="en-US"/>
           </a:p>
@@ -4265,7 +4265,7 @@
           <a:p>
             <a:fld id="{4C7F959B-C76D-4575-9470-CE5E6063DE88}" type="datetimeFigureOut">
               <a:rPr lang="en-US" smtClean="0"/>
-              <a:t>3/27/2018</a:t>
+              <a:t>27-Mar-18</a:t>
             </a:fld>
             <a:endParaRPr lang="en-US"/>
           </a:p>
@@ -5006,6 +5006,169 @@
           <a:chExt cx="0" cy="0"/>
         </a:xfrm>
       </p:grpSpPr>
+      <p:sp>
+        <p:nvSpPr>
+          <p:cNvPr id="2" name="Title 1">
+            <a:extLst>
+              <a:ext uri="{FF2B5EF4-FFF2-40B4-BE49-F238E27FC236}">
+                <a16:creationId xmlns:a16="http://schemas.microsoft.com/office/drawing/2014/main" id="{88A8A327-822B-4D99-81ED-CB23238E4D54}"/>
+              </a:ext>
+            </a:extLst>
+          </p:cNvPr>
+          <p:cNvSpPr>
+            <a:spLocks noGrp="1"/>
+          </p:cNvSpPr>
+          <p:nvPr>
+            <p:ph type="title"/>
+          </p:nvPr>
+        </p:nvSpPr>
+        <p:spPr/>
+        <p:txBody>
+          <a:bodyPr/>
+          <a:lstStyle/>
+          <a:p>
+            <a:r>
+              <a:rPr lang="en-SG" dirty="0"/>
+              <a:t>Scenario</a:t>
+            </a:r>
+            <a:endParaRPr lang="en-US" dirty="0"/>
+          </a:p>
+        </p:txBody>
+      </p:sp>
+      <p:sp>
+        <p:nvSpPr>
+          <p:cNvPr id="3" name="Content Placeholder 2">
+            <a:extLst>
+              <a:ext uri="{FF2B5EF4-FFF2-40B4-BE49-F238E27FC236}">
+                <a16:creationId xmlns:a16="http://schemas.microsoft.com/office/drawing/2014/main" id="{3A1AC5E1-BB10-48F6-8A6B-D015713626EE}"/>
+              </a:ext>
+            </a:extLst>
+          </p:cNvPr>
+          <p:cNvSpPr>
+            <a:spLocks noGrp="1"/>
+          </p:cNvSpPr>
+          <p:nvPr>
+            <p:ph idx="1"/>
+          </p:nvPr>
+        </p:nvSpPr>
+        <p:spPr/>
+        <p:txBody>
+          <a:bodyPr/>
+          <a:lstStyle/>
+          <a:p>
+            <a:pPr marL="0" indent="0" algn="just">
+              <a:buNone/>
+            </a:pPr>
+            <a:r>
+              <a:rPr lang="en-SG" sz="3200" dirty="0"/>
+              <a:t>Public Transport network serves hundred of thousands of passengers everyday. Any disruption in the service would require mitigation actions to be taken to ensure minimal disruptions to the passengers.</a:t>
+            </a:r>
+          </a:p>
+          <a:p>
+            <a:pPr marL="0" indent="0" algn="just">
+              <a:buNone/>
+            </a:pPr>
+            <a:endParaRPr lang="en-SG" sz="3200" dirty="0"/>
+          </a:p>
+          <a:p>
+            <a:pPr marL="0" indent="0" algn="just">
+              <a:buNone/>
+            </a:pPr>
+            <a:r>
+              <a:rPr lang="en-SG" sz="3200" dirty="0"/>
+              <a:t>A </a:t>
+            </a:r>
+            <a:r>
+              <a:rPr lang="en-SG" sz="3200" u="sng" dirty="0">
+                <a:solidFill>
+                  <a:srgbClr val="00B0F0"/>
+                </a:solidFill>
+              </a:rPr>
+              <a:t>well-integrated</a:t>
+            </a:r>
+            <a:r>
+              <a:rPr lang="en-SG" sz="3200" dirty="0"/>
+              <a:t> public transport network </a:t>
+            </a:r>
+            <a:r>
+              <a:rPr lang="en-SG" sz="3200" u="sng" dirty="0">
+                <a:solidFill>
+                  <a:srgbClr val="00B0F0"/>
+                </a:solidFill>
+              </a:rPr>
+              <a:t>across multiple systems</a:t>
+            </a:r>
+            <a:r>
+              <a:rPr lang="en-SG" sz="3200" dirty="0"/>
+              <a:t> with the various stakeholders will help enhance the communication and </a:t>
+            </a:r>
+            <a:r>
+              <a:rPr lang="en-SG" sz="3200" u="sng" dirty="0">
+                <a:solidFill>
+                  <a:srgbClr val="00B0F0"/>
+                </a:solidFill>
+              </a:rPr>
+              <a:t>automate processes</a:t>
+            </a:r>
+            <a:r>
+              <a:rPr lang="en-SG" sz="3200" dirty="0">
+                <a:solidFill>
+                  <a:srgbClr val="00B0F0"/>
+                </a:solidFill>
+              </a:rPr>
+              <a:t> </a:t>
+            </a:r>
+            <a:r>
+              <a:rPr lang="en-SG" sz="3200" dirty="0"/>
+              <a:t>when mitigation actions are required</a:t>
+            </a:r>
+          </a:p>
+          <a:p>
+            <a:pPr marL="0" indent="0">
+              <a:buNone/>
+            </a:pPr>
+            <a:endParaRPr lang="en-SG" dirty="0"/>
+          </a:p>
+        </p:txBody>
+      </p:sp>
+    </p:spTree>
+    <p:extLst>
+      <p:ext uri="{BB962C8B-B14F-4D97-AF65-F5344CB8AC3E}">
+        <p14:creationId xmlns:p14="http://schemas.microsoft.com/office/powerpoint/2010/main" val="1884342347"/>
+      </p:ext>
+    </p:extLst>
+  </p:cSld>
+  <p:clrMapOvr>
+    <a:masterClrMapping/>
+  </p:clrMapOvr>
+</p:sld>
+</file>
+
+<file path=ppt/slides/slide3.xml><?xml version="1.0" encoding="utf-8"?>
+<p:sld xmlns:a="http://schemas.openxmlformats.org/drawingml/2006/main" xmlns:r="http://schemas.openxmlformats.org/officeDocument/2006/relationships" xmlns:p="http://schemas.openxmlformats.org/presentationml/2006/main">
+  <p:cSld>
+    <p:bg>
+      <p:bgPr>
+        <a:solidFill>
+          <a:schemeClr val="bg1"/>
+        </a:solidFill>
+        <a:effectLst/>
+      </p:bgPr>
+    </p:bg>
+    <p:spTree>
+      <p:nvGrpSpPr>
+        <p:cNvPr id="1" name=""/>
+        <p:cNvGrpSpPr/>
+        <p:nvPr/>
+      </p:nvGrpSpPr>
+      <p:grpSpPr>
+        <a:xfrm>
+          <a:off x="0" y="0"/>
+          <a:ext cx="0" cy="0"/>
+          <a:chOff x="0" y="0"/>
+          <a:chExt cx="0" cy="0"/>
+        </a:xfrm>
+      </p:grpSpPr>
       <p:pic>
         <p:nvPicPr>
           <p:cNvPr id="6" name="Picture 5">
@@ -5231,169 +5394,6 @@
     <p:extLst>
       <p:ext uri="{BB962C8B-B14F-4D97-AF65-F5344CB8AC3E}">
         <p14:creationId xmlns:p14="http://schemas.microsoft.com/office/powerpoint/2010/main" val="3968445112"/>
-      </p:ext>
-    </p:extLst>
-  </p:cSld>
-  <p:clrMapOvr>
-    <a:masterClrMapping/>
-  </p:clrMapOvr>
-</p:sld>
-</file>
-
-<file path=ppt/slides/slide3.xml><?xml version="1.0" encoding="utf-8"?>
-<p:sld xmlns:a="http://schemas.openxmlformats.org/drawingml/2006/main" xmlns:r="http://schemas.openxmlformats.org/officeDocument/2006/relationships" xmlns:p="http://schemas.openxmlformats.org/presentationml/2006/main">
-  <p:cSld>
-    <p:bg>
-      <p:bgPr>
-        <a:solidFill>
-          <a:schemeClr val="bg1"/>
-        </a:solidFill>
-        <a:effectLst/>
-      </p:bgPr>
-    </p:bg>
-    <p:spTree>
-      <p:nvGrpSpPr>
-        <p:cNvPr id="1" name=""/>
-        <p:cNvGrpSpPr/>
-        <p:nvPr/>
-      </p:nvGrpSpPr>
-      <p:grpSpPr>
-        <a:xfrm>
-          <a:off x="0" y="0"/>
-          <a:ext cx="0" cy="0"/>
-          <a:chOff x="0" y="0"/>
-          <a:chExt cx="0" cy="0"/>
-        </a:xfrm>
-      </p:grpSpPr>
-      <p:sp>
-        <p:nvSpPr>
-          <p:cNvPr id="2" name="Title 1">
-            <a:extLst>
-              <a:ext uri="{FF2B5EF4-FFF2-40B4-BE49-F238E27FC236}">
-                <a16:creationId xmlns:a16="http://schemas.microsoft.com/office/drawing/2014/main" id="{88A8A327-822B-4D99-81ED-CB23238E4D54}"/>
-              </a:ext>
-            </a:extLst>
-          </p:cNvPr>
-          <p:cNvSpPr>
-            <a:spLocks noGrp="1"/>
-          </p:cNvSpPr>
-          <p:nvPr>
-            <p:ph type="title"/>
-          </p:nvPr>
-        </p:nvSpPr>
-        <p:spPr/>
-        <p:txBody>
-          <a:bodyPr/>
-          <a:lstStyle/>
-          <a:p>
-            <a:r>
-              <a:rPr lang="en-SG" dirty="0"/>
-              <a:t>Scenario</a:t>
-            </a:r>
-            <a:endParaRPr lang="en-US" dirty="0"/>
-          </a:p>
-        </p:txBody>
-      </p:sp>
-      <p:sp>
-        <p:nvSpPr>
-          <p:cNvPr id="3" name="Content Placeholder 2">
-            <a:extLst>
-              <a:ext uri="{FF2B5EF4-FFF2-40B4-BE49-F238E27FC236}">
-                <a16:creationId xmlns:a16="http://schemas.microsoft.com/office/drawing/2014/main" id="{3A1AC5E1-BB10-48F6-8A6B-D015713626EE}"/>
-              </a:ext>
-            </a:extLst>
-          </p:cNvPr>
-          <p:cNvSpPr>
-            <a:spLocks noGrp="1"/>
-          </p:cNvSpPr>
-          <p:nvPr>
-            <p:ph idx="1"/>
-          </p:nvPr>
-        </p:nvSpPr>
-        <p:spPr/>
-        <p:txBody>
-          <a:bodyPr/>
-          <a:lstStyle/>
-          <a:p>
-            <a:pPr marL="0" indent="0" algn="just">
-              <a:buNone/>
-            </a:pPr>
-            <a:r>
-              <a:rPr lang="en-SG" sz="3200" dirty="0"/>
-              <a:t>Public Transport network serves hundred of thousands of passengers everyday. Any disruption in the service would require mitigation actions to be taken to ensure minimal disruptions to the passengers.</a:t>
-            </a:r>
-          </a:p>
-          <a:p>
-            <a:pPr marL="0" indent="0" algn="just">
-              <a:buNone/>
-            </a:pPr>
-            <a:endParaRPr lang="en-SG" sz="3200" dirty="0"/>
-          </a:p>
-          <a:p>
-            <a:pPr marL="0" indent="0" algn="just">
-              <a:buNone/>
-            </a:pPr>
-            <a:r>
-              <a:rPr lang="en-SG" sz="3200" dirty="0"/>
-              <a:t>A </a:t>
-            </a:r>
-            <a:r>
-              <a:rPr lang="en-SG" sz="3200" u="sng" dirty="0">
-                <a:solidFill>
-                  <a:srgbClr val="00B0F0"/>
-                </a:solidFill>
-              </a:rPr>
-              <a:t>well-integrated</a:t>
-            </a:r>
-            <a:r>
-              <a:rPr lang="en-SG" sz="3200" dirty="0"/>
-              <a:t> public transport network </a:t>
-            </a:r>
-            <a:r>
-              <a:rPr lang="en-SG" sz="3200" u="sng" dirty="0">
-                <a:solidFill>
-                  <a:srgbClr val="00B0F0"/>
-                </a:solidFill>
-              </a:rPr>
-              <a:t>across multiple systems</a:t>
-            </a:r>
-            <a:r>
-              <a:rPr lang="en-SG" sz="3200" dirty="0"/>
-              <a:t> with the various stakeholders will help enhance the communication and </a:t>
-            </a:r>
-            <a:r>
-              <a:rPr lang="en-SG" sz="3200" u="sng" dirty="0">
-                <a:solidFill>
-                  <a:srgbClr val="00B0F0"/>
-                </a:solidFill>
-              </a:rPr>
-              <a:t>automate processes</a:t>
-            </a:r>
-            <a:r>
-              <a:rPr lang="en-SG" sz="3200" dirty="0">
-                <a:solidFill>
-                  <a:srgbClr val="00B0F0"/>
-                </a:solidFill>
-              </a:rPr>
-              <a:t> </a:t>
-            </a:r>
-            <a:r>
-              <a:rPr lang="en-SG" sz="3200" dirty="0"/>
-              <a:t>when mitigation actions are required</a:t>
-            </a:r>
-          </a:p>
-          <a:p>
-            <a:pPr marL="0" indent="0">
-              <a:buNone/>
-            </a:pPr>
-            <a:endParaRPr lang="en-SG" dirty="0"/>
-          </a:p>
-        </p:txBody>
-      </p:sp>
-    </p:spTree>
-    <p:extLst>
-      <p:ext uri="{BB962C8B-B14F-4D97-AF65-F5344CB8AC3E}">
-        <p14:creationId xmlns:p14="http://schemas.microsoft.com/office/powerpoint/2010/main" val="1884342347"/>
       </p:ext>
     </p:extLst>
   </p:cSld>

</xml_diff>

<commit_message>
+ added 3 slides to the ppt
</commit_message>
<xml_diff>
--- a/EI Presentation.pptx
+++ b/EI Presentation.pptx
@@ -5,7 +5,7 @@
     <p:sldMasterId id="2147483672" r:id="rId1"/>
   </p:sldMasterIdLst>
   <p:notesMasterIdLst>
-    <p:notesMasterId r:id="rId7"/>
+    <p:notesMasterId r:id="rId10"/>
   </p:notesMasterIdLst>
   <p:sldIdLst>
     <p:sldId id="258" r:id="rId2"/>
@@ -13,6 +13,9 @@
     <p:sldId id="259" r:id="rId4"/>
     <p:sldId id="257" r:id="rId5"/>
     <p:sldId id="261" r:id="rId6"/>
+    <p:sldId id="264" r:id="rId7"/>
+    <p:sldId id="265" r:id="rId8"/>
+    <p:sldId id="266" r:id="rId9"/>
   </p:sldIdLst>
   <p:sldSz cx="12192000" cy="6858000"/>
   <p:notesSz cx="6858000" cy="9144000"/>
@@ -1107,7 +1110,7 @@
           <a:p>
             <a:fld id="{2969D29A-BED7-4F52-827A-C7D8A439955D}" type="datetimeFigureOut">
               <a:rPr lang="en-US" smtClean="0"/>
-              <a:t>27-Mar-18</a:t>
+              <a:t>3/28/2018</a:t>
             </a:fld>
             <a:endParaRPr lang="en-US"/>
           </a:p>
@@ -1605,7 +1608,7 @@
           <a:p>
             <a:fld id="{4C7F959B-C76D-4575-9470-CE5E6063DE88}" type="datetimeFigureOut">
               <a:rPr lang="en-US" smtClean="0"/>
-              <a:t>27-Mar-18</a:t>
+              <a:t>3/28/2018</a:t>
             </a:fld>
             <a:endParaRPr lang="en-US"/>
           </a:p>
@@ -1803,7 +1806,7 @@
           <a:p>
             <a:fld id="{4C7F959B-C76D-4575-9470-CE5E6063DE88}" type="datetimeFigureOut">
               <a:rPr lang="en-US" smtClean="0"/>
-              <a:t>27-Mar-18</a:t>
+              <a:t>3/28/2018</a:t>
             </a:fld>
             <a:endParaRPr lang="en-US"/>
           </a:p>
@@ -2011,7 +2014,7 @@
           <a:p>
             <a:fld id="{4C7F959B-C76D-4575-9470-CE5E6063DE88}" type="datetimeFigureOut">
               <a:rPr lang="en-US" smtClean="0"/>
-              <a:t>27-Mar-18</a:t>
+              <a:t>3/28/2018</a:t>
             </a:fld>
             <a:endParaRPr lang="en-US"/>
           </a:p>
@@ -2209,7 +2212,7 @@
           <a:p>
             <a:fld id="{4C7F959B-C76D-4575-9470-CE5E6063DE88}" type="datetimeFigureOut">
               <a:rPr lang="en-US" smtClean="0"/>
-              <a:t>27-Mar-18</a:t>
+              <a:t>3/28/2018</a:t>
             </a:fld>
             <a:endParaRPr lang="en-US"/>
           </a:p>
@@ -2484,7 +2487,7 @@
           <a:p>
             <a:fld id="{4C7F959B-C76D-4575-9470-CE5E6063DE88}" type="datetimeFigureOut">
               <a:rPr lang="en-US" smtClean="0"/>
-              <a:t>27-Mar-18</a:t>
+              <a:t>3/28/2018</a:t>
             </a:fld>
             <a:endParaRPr lang="en-US"/>
           </a:p>
@@ -2749,7 +2752,7 @@
           <a:p>
             <a:fld id="{4C7F959B-C76D-4575-9470-CE5E6063DE88}" type="datetimeFigureOut">
               <a:rPr lang="en-US" smtClean="0"/>
-              <a:t>27-Mar-18</a:t>
+              <a:t>3/28/2018</a:t>
             </a:fld>
             <a:endParaRPr lang="en-US"/>
           </a:p>
@@ -3161,7 +3164,7 @@
           <a:p>
             <a:fld id="{4C7F959B-C76D-4575-9470-CE5E6063DE88}" type="datetimeFigureOut">
               <a:rPr lang="en-US" smtClean="0"/>
-              <a:t>27-Mar-18</a:t>
+              <a:t>3/28/2018</a:t>
             </a:fld>
             <a:endParaRPr lang="en-US"/>
           </a:p>
@@ -3302,7 +3305,7 @@
           <a:p>
             <a:fld id="{4C7F959B-C76D-4575-9470-CE5E6063DE88}" type="datetimeFigureOut">
               <a:rPr lang="en-US" smtClean="0"/>
-              <a:t>27-Mar-18</a:t>
+              <a:t>3/28/2018</a:t>
             </a:fld>
             <a:endParaRPr lang="en-US"/>
           </a:p>
@@ -3415,7 +3418,7 @@
           <a:p>
             <a:fld id="{4C7F959B-C76D-4575-9470-CE5E6063DE88}" type="datetimeFigureOut">
               <a:rPr lang="en-US" smtClean="0"/>
-              <a:t>27-Mar-18</a:t>
+              <a:t>3/28/2018</a:t>
             </a:fld>
             <a:endParaRPr lang="en-US"/>
           </a:p>
@@ -3726,7 +3729,7 @@
           <a:p>
             <a:fld id="{4C7F959B-C76D-4575-9470-CE5E6063DE88}" type="datetimeFigureOut">
               <a:rPr lang="en-US" smtClean="0"/>
-              <a:t>27-Mar-18</a:t>
+              <a:t>3/28/2018</a:t>
             </a:fld>
             <a:endParaRPr lang="en-US"/>
           </a:p>
@@ -4014,7 +4017,7 @@
           <a:p>
             <a:fld id="{4C7F959B-C76D-4575-9470-CE5E6063DE88}" type="datetimeFigureOut">
               <a:rPr lang="en-US" smtClean="0"/>
-              <a:t>27-Mar-18</a:t>
+              <a:t>3/28/2018</a:t>
             </a:fld>
             <a:endParaRPr lang="en-US"/>
           </a:p>
@@ -4265,7 +4268,7 @@
           <a:p>
             <a:fld id="{4C7F959B-C76D-4575-9470-CE5E6063DE88}" type="datetimeFigureOut">
               <a:rPr lang="en-US" smtClean="0"/>
-              <a:t>27-Mar-18</a:t>
+              <a:t>3/28/2018</a:t>
             </a:fld>
             <a:endParaRPr lang="en-US"/>
           </a:p>
@@ -9011,6 +9014,285 @@
     <p:extLst>
       <p:ext uri="{BB962C8B-B14F-4D97-AF65-F5344CB8AC3E}">
         <p14:creationId xmlns:p14="http://schemas.microsoft.com/office/powerpoint/2010/main" val="3129491093"/>
+      </p:ext>
+    </p:extLst>
+  </p:cSld>
+  <p:clrMapOvr>
+    <a:masterClrMapping/>
+  </p:clrMapOvr>
+</p:sld>
+</file>
+
+<file path=ppt/slides/slide6.xml><?xml version="1.0" encoding="utf-8"?>
+<p:sld xmlns:a="http://schemas.openxmlformats.org/drawingml/2006/main" xmlns:r="http://schemas.openxmlformats.org/officeDocument/2006/relationships" xmlns:p="http://schemas.openxmlformats.org/presentationml/2006/main">
+  <p:cSld>
+    <p:spTree>
+      <p:nvGrpSpPr>
+        <p:cNvPr id="1" name=""/>
+        <p:cNvGrpSpPr/>
+        <p:nvPr/>
+      </p:nvGrpSpPr>
+      <p:grpSpPr>
+        <a:xfrm>
+          <a:off x="0" y="0"/>
+          <a:ext cx="0" cy="0"/>
+          <a:chOff x="0" y="0"/>
+          <a:chExt cx="0" cy="0"/>
+        </a:xfrm>
+      </p:grpSpPr>
+      <p:sp>
+        <p:nvSpPr>
+          <p:cNvPr id="5" name="Title 4">
+            <a:extLst>
+              <a:ext uri="{FF2B5EF4-FFF2-40B4-BE49-F238E27FC236}">
+                <a16:creationId xmlns:a16="http://schemas.microsoft.com/office/drawing/2014/main" id="{475E9C6B-D357-4170-A190-77D3BE5E3D88}"/>
+              </a:ext>
+            </a:extLst>
+          </p:cNvPr>
+          <p:cNvSpPr>
+            <a:spLocks noGrp="1"/>
+          </p:cNvSpPr>
+          <p:nvPr>
+            <p:ph type="title"/>
+          </p:nvPr>
+        </p:nvSpPr>
+        <p:spPr/>
+        <p:txBody>
+          <a:bodyPr anchor="ctr"/>
+          <a:lstStyle/>
+          <a:p>
+            <a:pPr algn="ctr"/>
+            <a:r>
+              <a:rPr lang="en-GB" b="1" dirty="0">
+                <a:solidFill>
+                  <a:schemeClr val="bg1"/>
+                </a:solidFill>
+              </a:rPr>
+              <a:t>Train Breakdown and Resumption of Service Process</a:t>
+            </a:r>
+            <a:endParaRPr lang="en-SG" dirty="0">
+              <a:solidFill>
+                <a:schemeClr val="bg1"/>
+              </a:solidFill>
+            </a:endParaRPr>
+          </a:p>
+        </p:txBody>
+      </p:sp>
+      <p:sp>
+        <p:nvSpPr>
+          <p:cNvPr id="6" name="Text Placeholder 5">
+            <a:extLst>
+              <a:ext uri="{FF2B5EF4-FFF2-40B4-BE49-F238E27FC236}">
+                <a16:creationId xmlns:a16="http://schemas.microsoft.com/office/drawing/2014/main" id="{A643C0C4-4A5D-478F-87B9-06120B4AF779}"/>
+              </a:ext>
+            </a:extLst>
+          </p:cNvPr>
+          <p:cNvSpPr>
+            <a:spLocks noGrp="1"/>
+          </p:cNvSpPr>
+          <p:nvPr>
+            <p:ph type="body" idx="1"/>
+          </p:nvPr>
+        </p:nvSpPr>
+        <p:spPr/>
+        <p:txBody>
+          <a:bodyPr/>
+          <a:lstStyle/>
+          <a:p>
+            <a:endParaRPr lang="en-SG"/>
+          </a:p>
+        </p:txBody>
+      </p:sp>
+    </p:spTree>
+    <p:extLst>
+      <p:ext uri="{BB962C8B-B14F-4D97-AF65-F5344CB8AC3E}">
+        <p14:creationId xmlns:p14="http://schemas.microsoft.com/office/powerpoint/2010/main" val="3435162448"/>
+      </p:ext>
+    </p:extLst>
+  </p:cSld>
+  <p:clrMapOvr>
+    <a:masterClrMapping/>
+  </p:clrMapOvr>
+</p:sld>
+</file>
+
+<file path=ppt/slides/slide7.xml><?xml version="1.0" encoding="utf-8"?>
+<p:sld xmlns:a="http://schemas.openxmlformats.org/drawingml/2006/main" xmlns:r="http://schemas.openxmlformats.org/officeDocument/2006/relationships" xmlns:p="http://schemas.openxmlformats.org/presentationml/2006/main">
+  <p:cSld>
+    <p:spTree>
+      <p:nvGrpSpPr>
+        <p:cNvPr id="1" name=""/>
+        <p:cNvGrpSpPr/>
+        <p:nvPr/>
+      </p:nvGrpSpPr>
+      <p:grpSpPr>
+        <a:xfrm>
+          <a:off x="0" y="0"/>
+          <a:ext cx="0" cy="0"/>
+          <a:chOff x="0" y="0"/>
+          <a:chExt cx="0" cy="0"/>
+        </a:xfrm>
+      </p:grpSpPr>
+      <p:sp>
+        <p:nvSpPr>
+          <p:cNvPr id="5" name="Title 4">
+            <a:extLst>
+              <a:ext uri="{FF2B5EF4-FFF2-40B4-BE49-F238E27FC236}">
+                <a16:creationId xmlns:a16="http://schemas.microsoft.com/office/drawing/2014/main" id="{475E9C6B-D357-4170-A190-77D3BE5E3D88}"/>
+              </a:ext>
+            </a:extLst>
+          </p:cNvPr>
+          <p:cNvSpPr>
+            <a:spLocks noGrp="1"/>
+          </p:cNvSpPr>
+          <p:nvPr>
+            <p:ph type="title"/>
+          </p:nvPr>
+        </p:nvSpPr>
+        <p:spPr/>
+        <p:txBody>
+          <a:bodyPr anchor="ctr"/>
+          <a:lstStyle/>
+          <a:p>
+            <a:pPr algn="ctr"/>
+            <a:r>
+              <a:rPr lang="en-GB" b="1" dirty="0">
+                <a:solidFill>
+                  <a:schemeClr val="bg1"/>
+                </a:solidFill>
+              </a:rPr>
+              <a:t>Weather Reporting Process</a:t>
+            </a:r>
+            <a:endParaRPr lang="en-SG" dirty="0">
+              <a:solidFill>
+                <a:schemeClr val="bg1"/>
+              </a:solidFill>
+            </a:endParaRPr>
+          </a:p>
+        </p:txBody>
+      </p:sp>
+      <p:sp>
+        <p:nvSpPr>
+          <p:cNvPr id="6" name="Text Placeholder 5">
+            <a:extLst>
+              <a:ext uri="{FF2B5EF4-FFF2-40B4-BE49-F238E27FC236}">
+                <a16:creationId xmlns:a16="http://schemas.microsoft.com/office/drawing/2014/main" id="{A643C0C4-4A5D-478F-87B9-06120B4AF779}"/>
+              </a:ext>
+            </a:extLst>
+          </p:cNvPr>
+          <p:cNvSpPr>
+            <a:spLocks noGrp="1"/>
+          </p:cNvSpPr>
+          <p:nvPr>
+            <p:ph type="body" idx="1"/>
+          </p:nvPr>
+        </p:nvSpPr>
+        <p:spPr/>
+        <p:txBody>
+          <a:bodyPr/>
+          <a:lstStyle/>
+          <a:p>
+            <a:endParaRPr lang="en-SG"/>
+          </a:p>
+        </p:txBody>
+      </p:sp>
+    </p:spTree>
+    <p:extLst>
+      <p:ext uri="{BB962C8B-B14F-4D97-AF65-F5344CB8AC3E}">
+        <p14:creationId xmlns:p14="http://schemas.microsoft.com/office/powerpoint/2010/main" val="376642483"/>
+      </p:ext>
+    </p:extLst>
+  </p:cSld>
+  <p:clrMapOvr>
+    <a:masterClrMapping/>
+  </p:clrMapOvr>
+</p:sld>
+</file>
+
+<file path=ppt/slides/slide8.xml><?xml version="1.0" encoding="utf-8"?>
+<p:sld xmlns:a="http://schemas.openxmlformats.org/drawingml/2006/main" xmlns:r="http://schemas.openxmlformats.org/officeDocument/2006/relationships" xmlns:p="http://schemas.openxmlformats.org/presentationml/2006/main">
+  <p:cSld>
+    <p:spTree>
+      <p:nvGrpSpPr>
+        <p:cNvPr id="1" name=""/>
+        <p:cNvGrpSpPr/>
+        <p:nvPr/>
+      </p:nvGrpSpPr>
+      <p:grpSpPr>
+        <a:xfrm>
+          <a:off x="0" y="0"/>
+          <a:ext cx="0" cy="0"/>
+          <a:chOff x="0" y="0"/>
+          <a:chExt cx="0" cy="0"/>
+        </a:xfrm>
+      </p:grpSpPr>
+      <p:sp>
+        <p:nvSpPr>
+          <p:cNvPr id="5" name="Title 4">
+            <a:extLst>
+              <a:ext uri="{FF2B5EF4-FFF2-40B4-BE49-F238E27FC236}">
+                <a16:creationId xmlns:a16="http://schemas.microsoft.com/office/drawing/2014/main" id="{475E9C6B-D357-4170-A190-77D3BE5E3D88}"/>
+              </a:ext>
+            </a:extLst>
+          </p:cNvPr>
+          <p:cNvSpPr>
+            <a:spLocks noGrp="1"/>
+          </p:cNvSpPr>
+          <p:nvPr>
+            <p:ph type="title"/>
+          </p:nvPr>
+        </p:nvSpPr>
+        <p:spPr/>
+        <p:txBody>
+          <a:bodyPr anchor="ctr"/>
+          <a:lstStyle/>
+          <a:p>
+            <a:pPr algn="ctr"/>
+            <a:r>
+              <a:rPr lang="en-GB" b="1" dirty="0">
+                <a:solidFill>
+                  <a:schemeClr val="bg1"/>
+                </a:solidFill>
+              </a:rPr>
+              <a:t>Schedule Polling Process</a:t>
+            </a:r>
+            <a:endParaRPr lang="en-SG" b="1" dirty="0">
+              <a:solidFill>
+                <a:schemeClr val="bg1"/>
+              </a:solidFill>
+            </a:endParaRPr>
+          </a:p>
+        </p:txBody>
+      </p:sp>
+      <p:sp>
+        <p:nvSpPr>
+          <p:cNvPr id="6" name="Text Placeholder 5">
+            <a:extLst>
+              <a:ext uri="{FF2B5EF4-FFF2-40B4-BE49-F238E27FC236}">
+                <a16:creationId xmlns:a16="http://schemas.microsoft.com/office/drawing/2014/main" id="{A643C0C4-4A5D-478F-87B9-06120B4AF779}"/>
+              </a:ext>
+            </a:extLst>
+          </p:cNvPr>
+          <p:cNvSpPr>
+            <a:spLocks noGrp="1"/>
+          </p:cNvSpPr>
+          <p:nvPr>
+            <p:ph type="body" idx="1"/>
+          </p:nvPr>
+        </p:nvSpPr>
+        <p:spPr/>
+        <p:txBody>
+          <a:bodyPr/>
+          <a:lstStyle/>
+          <a:p>
+            <a:endParaRPr lang="en-SG"/>
+          </a:p>
+        </p:txBody>
+      </p:sp>
+    </p:spTree>
+    <p:extLst>
+      <p:ext uri="{BB962C8B-B14F-4D97-AF65-F5344CB8AC3E}">
+        <p14:creationId xmlns:p14="http://schemas.microsoft.com/office/powerpoint/2010/main" val="2363839823"/>
       </p:ext>
     </p:extLst>
   </p:cSld>

</xml_diff>

<commit_message>
+edited shape on tibco +Added shape to slides
</commit_message>
<xml_diff>
--- a/EI Presentation.pptx
+++ b/EI Presentation.pptx
@@ -5,7 +5,7 @@
     <p:sldMasterId id="2147483672" r:id="rId1"/>
   </p:sldMasterIdLst>
   <p:notesMasterIdLst>
-    <p:notesMasterId r:id="rId17"/>
+    <p:notesMasterId r:id="rId18"/>
   </p:notesMasterIdLst>
   <p:sldIdLst>
     <p:sldId id="258" r:id="rId2"/>
@@ -15,14 +15,15 @@
     <p:sldId id="270" r:id="rId6"/>
     <p:sldId id="264" r:id="rId7"/>
     <p:sldId id="268" r:id="rId8"/>
-    <p:sldId id="272" r:id="rId9"/>
-    <p:sldId id="265" r:id="rId10"/>
-    <p:sldId id="269" r:id="rId11"/>
-    <p:sldId id="273" r:id="rId12"/>
-    <p:sldId id="266" r:id="rId13"/>
-    <p:sldId id="271" r:id="rId14"/>
-    <p:sldId id="274" r:id="rId15"/>
-    <p:sldId id="261" r:id="rId16"/>
+    <p:sldId id="275" r:id="rId9"/>
+    <p:sldId id="272" r:id="rId10"/>
+    <p:sldId id="265" r:id="rId11"/>
+    <p:sldId id="269" r:id="rId12"/>
+    <p:sldId id="273" r:id="rId13"/>
+    <p:sldId id="266" r:id="rId14"/>
+    <p:sldId id="271" r:id="rId15"/>
+    <p:sldId id="274" r:id="rId16"/>
+    <p:sldId id="261" r:id="rId17"/>
   </p:sldIdLst>
   <p:sldSz cx="12192000" cy="6858000"/>
   <p:notesSz cx="6858000" cy="9144000"/>
@@ -1117,7 +1118,7 @@
           <a:p>
             <a:fld id="{2969D29A-BED7-4F52-827A-C7D8A439955D}" type="datetimeFigureOut">
               <a:rPr lang="en-US" smtClean="0"/>
-              <a:t>28-Mar-18</a:t>
+              <a:t>3/29/2018</a:t>
             </a:fld>
             <a:endParaRPr lang="en-US"/>
           </a:p>
@@ -1533,7 +1534,7 @@
           <a:p>
             <a:fld id="{2ED0950B-CCD5-4407-A111-A6EE205BBF47}" type="slidenum">
               <a:rPr lang="en-US" smtClean="0"/>
-              <a:t>8</a:t>
+              <a:t>9</a:t>
             </a:fld>
             <a:endParaRPr lang="en-US"/>
           </a:p>
@@ -1617,7 +1618,7 @@
           <a:p>
             <a:fld id="{2ED0950B-CCD5-4407-A111-A6EE205BBF47}" type="slidenum">
               <a:rPr lang="en-US" smtClean="0"/>
-              <a:t>11</a:t>
+              <a:t>12</a:t>
             </a:fld>
             <a:endParaRPr lang="en-US"/>
           </a:p>
@@ -1701,7 +1702,7 @@
           <a:p>
             <a:fld id="{2ED0950B-CCD5-4407-A111-A6EE205BBF47}" type="slidenum">
               <a:rPr lang="en-US" smtClean="0"/>
-              <a:t>14</a:t>
+              <a:t>15</a:t>
             </a:fld>
             <a:endParaRPr lang="en-US"/>
           </a:p>
@@ -1867,7 +1868,7 @@
           <a:p>
             <a:fld id="{4C7F959B-C76D-4575-9470-CE5E6063DE88}" type="datetimeFigureOut">
               <a:rPr lang="en-US" smtClean="0"/>
-              <a:t>28-Mar-18</a:t>
+              <a:t>3/29/2018</a:t>
             </a:fld>
             <a:endParaRPr lang="en-US"/>
           </a:p>
@@ -2065,7 +2066,7 @@
           <a:p>
             <a:fld id="{4C7F959B-C76D-4575-9470-CE5E6063DE88}" type="datetimeFigureOut">
               <a:rPr lang="en-US" smtClean="0"/>
-              <a:t>28-Mar-18</a:t>
+              <a:t>3/29/2018</a:t>
             </a:fld>
             <a:endParaRPr lang="en-US"/>
           </a:p>
@@ -2273,7 +2274,7 @@
           <a:p>
             <a:fld id="{4C7F959B-C76D-4575-9470-CE5E6063DE88}" type="datetimeFigureOut">
               <a:rPr lang="en-US" smtClean="0"/>
-              <a:t>28-Mar-18</a:t>
+              <a:t>3/29/2018</a:t>
             </a:fld>
             <a:endParaRPr lang="en-US"/>
           </a:p>
@@ -2471,7 +2472,7 @@
           <a:p>
             <a:fld id="{4C7F959B-C76D-4575-9470-CE5E6063DE88}" type="datetimeFigureOut">
               <a:rPr lang="en-US" smtClean="0"/>
-              <a:t>28-Mar-18</a:t>
+              <a:t>3/29/2018</a:t>
             </a:fld>
             <a:endParaRPr lang="en-US"/>
           </a:p>
@@ -2746,7 +2747,7 @@
           <a:p>
             <a:fld id="{4C7F959B-C76D-4575-9470-CE5E6063DE88}" type="datetimeFigureOut">
               <a:rPr lang="en-US" smtClean="0"/>
-              <a:t>28-Mar-18</a:t>
+              <a:t>3/29/2018</a:t>
             </a:fld>
             <a:endParaRPr lang="en-US"/>
           </a:p>
@@ -3011,7 +3012,7 @@
           <a:p>
             <a:fld id="{4C7F959B-C76D-4575-9470-CE5E6063DE88}" type="datetimeFigureOut">
               <a:rPr lang="en-US" smtClean="0"/>
-              <a:t>28-Mar-18</a:t>
+              <a:t>3/29/2018</a:t>
             </a:fld>
             <a:endParaRPr lang="en-US"/>
           </a:p>
@@ -3423,7 +3424,7 @@
           <a:p>
             <a:fld id="{4C7F959B-C76D-4575-9470-CE5E6063DE88}" type="datetimeFigureOut">
               <a:rPr lang="en-US" smtClean="0"/>
-              <a:t>28-Mar-18</a:t>
+              <a:t>3/29/2018</a:t>
             </a:fld>
             <a:endParaRPr lang="en-US"/>
           </a:p>
@@ -3564,7 +3565,7 @@
           <a:p>
             <a:fld id="{4C7F959B-C76D-4575-9470-CE5E6063DE88}" type="datetimeFigureOut">
               <a:rPr lang="en-US" smtClean="0"/>
-              <a:t>28-Mar-18</a:t>
+              <a:t>3/29/2018</a:t>
             </a:fld>
             <a:endParaRPr lang="en-US"/>
           </a:p>
@@ -3677,7 +3678,7 @@
           <a:p>
             <a:fld id="{4C7F959B-C76D-4575-9470-CE5E6063DE88}" type="datetimeFigureOut">
               <a:rPr lang="en-US" smtClean="0"/>
-              <a:t>28-Mar-18</a:t>
+              <a:t>3/29/2018</a:t>
             </a:fld>
             <a:endParaRPr lang="en-US"/>
           </a:p>
@@ -3988,7 +3989,7 @@
           <a:p>
             <a:fld id="{4C7F959B-C76D-4575-9470-CE5E6063DE88}" type="datetimeFigureOut">
               <a:rPr lang="en-US" smtClean="0"/>
-              <a:t>28-Mar-18</a:t>
+              <a:t>3/29/2018</a:t>
             </a:fld>
             <a:endParaRPr lang="en-US"/>
           </a:p>
@@ -4276,7 +4277,7 @@
           <a:p>
             <a:fld id="{4C7F959B-C76D-4575-9470-CE5E6063DE88}" type="datetimeFigureOut">
               <a:rPr lang="en-US" smtClean="0"/>
-              <a:t>28-Mar-18</a:t>
+              <a:t>3/29/2018</a:t>
             </a:fld>
             <a:endParaRPr lang="en-US"/>
           </a:p>
@@ -4520,7 +4521,7 @@
           <a:p>
             <a:fld id="{4C7F959B-C76D-4575-9470-CE5E6063DE88}" type="datetimeFigureOut">
               <a:rPr lang="en-US" smtClean="0"/>
-              <a:t>28-Mar-18</a:t>
+              <a:t>3/29/2018</a:t>
             </a:fld>
             <a:endParaRPr lang="en-US"/>
           </a:p>
@@ -5199,6 +5200,105 @@
           <a:chExt cx="0" cy="0"/>
         </a:xfrm>
       </p:grpSpPr>
+      <p:sp>
+        <p:nvSpPr>
+          <p:cNvPr id="5" name="Title 4">
+            <a:extLst>
+              <a:ext uri="{FF2B5EF4-FFF2-40B4-BE49-F238E27FC236}">
+                <a16:creationId xmlns:a16="http://schemas.microsoft.com/office/drawing/2014/main" id="{475E9C6B-D357-4170-A190-77D3BE5E3D88}"/>
+              </a:ext>
+            </a:extLst>
+          </p:cNvPr>
+          <p:cNvSpPr>
+            <a:spLocks noGrp="1"/>
+          </p:cNvSpPr>
+          <p:nvPr>
+            <p:ph type="title"/>
+          </p:nvPr>
+        </p:nvSpPr>
+        <p:spPr/>
+        <p:txBody>
+          <a:bodyPr anchor="ctr"/>
+          <a:lstStyle/>
+          <a:p>
+            <a:pPr algn="ctr"/>
+            <a:r>
+              <a:rPr lang="en-GB" b="1" dirty="0">
+                <a:solidFill>
+                  <a:schemeClr val="tx1">
+                    <a:lumMod val="95000"/>
+                    <a:lumOff val="5000"/>
+                  </a:schemeClr>
+                </a:solidFill>
+              </a:rPr>
+              <a:t>Weather Reporting Process</a:t>
+            </a:r>
+            <a:endParaRPr lang="en-SG" dirty="0">
+              <a:solidFill>
+                <a:schemeClr val="tx1">
+                  <a:lumMod val="95000"/>
+                  <a:lumOff val="5000"/>
+                </a:schemeClr>
+              </a:solidFill>
+            </a:endParaRPr>
+          </a:p>
+        </p:txBody>
+      </p:sp>
+      <p:sp>
+        <p:nvSpPr>
+          <p:cNvPr id="6" name="Text Placeholder 5">
+            <a:extLst>
+              <a:ext uri="{FF2B5EF4-FFF2-40B4-BE49-F238E27FC236}">
+                <a16:creationId xmlns:a16="http://schemas.microsoft.com/office/drawing/2014/main" id="{A643C0C4-4A5D-478F-87B9-06120B4AF779}"/>
+              </a:ext>
+            </a:extLst>
+          </p:cNvPr>
+          <p:cNvSpPr>
+            <a:spLocks noGrp="1"/>
+          </p:cNvSpPr>
+          <p:nvPr>
+            <p:ph type="body" idx="1"/>
+          </p:nvPr>
+        </p:nvSpPr>
+        <p:spPr/>
+        <p:txBody>
+          <a:bodyPr/>
+          <a:lstStyle/>
+          <a:p>
+            <a:endParaRPr lang="en-SG"/>
+          </a:p>
+        </p:txBody>
+      </p:sp>
+    </p:spTree>
+    <p:extLst>
+      <p:ext uri="{BB962C8B-B14F-4D97-AF65-F5344CB8AC3E}">
+        <p14:creationId xmlns:p14="http://schemas.microsoft.com/office/powerpoint/2010/main" val="376642483"/>
+      </p:ext>
+    </p:extLst>
+  </p:cSld>
+  <p:clrMapOvr>
+    <a:masterClrMapping/>
+  </p:clrMapOvr>
+</p:sld>
+</file>
+
+<file path=ppt/slides/slide11.xml><?xml version="1.0" encoding="utf-8"?>
+<p:sld xmlns:a="http://schemas.openxmlformats.org/drawingml/2006/main" xmlns:r="http://schemas.openxmlformats.org/officeDocument/2006/relationships" xmlns:p="http://schemas.openxmlformats.org/presentationml/2006/main">
+  <p:cSld>
+    <p:spTree>
+      <p:nvGrpSpPr>
+        <p:cNvPr id="1" name=""/>
+        <p:cNvGrpSpPr/>
+        <p:nvPr/>
+      </p:nvGrpSpPr>
+      <p:grpSpPr>
+        <a:xfrm>
+          <a:off x="0" y="0"/>
+          <a:ext cx="0" cy="0"/>
+          <a:chOff x="0" y="0"/>
+          <a:chExt cx="0" cy="0"/>
+        </a:xfrm>
+      </p:grpSpPr>
       <p:pic>
         <p:nvPicPr>
           <p:cNvPr id="5" name="Picture 4">
@@ -5247,7 +5347,7 @@
 </p:sld>
 </file>
 
-<file path=ppt/slides/slide11.xml><?xml version="1.0" encoding="utf-8"?>
+<file path=ppt/slides/slide12.xml><?xml version="1.0" encoding="utf-8"?>
 <p:sld xmlns:a="http://schemas.openxmlformats.org/drawingml/2006/main" xmlns:r="http://schemas.openxmlformats.org/officeDocument/2006/relationships" xmlns:p="http://schemas.openxmlformats.org/presentationml/2006/main">
   <p:cSld>
     <p:spTree>
@@ -7036,105 +7136,6 @@
 </p:sld>
 </file>
 
-<file path=ppt/slides/slide12.xml><?xml version="1.0" encoding="utf-8"?>
-<p:sld xmlns:a="http://schemas.openxmlformats.org/drawingml/2006/main" xmlns:r="http://schemas.openxmlformats.org/officeDocument/2006/relationships" xmlns:p="http://schemas.openxmlformats.org/presentationml/2006/main">
-  <p:cSld>
-    <p:spTree>
-      <p:nvGrpSpPr>
-        <p:cNvPr id="1" name=""/>
-        <p:cNvGrpSpPr/>
-        <p:nvPr/>
-      </p:nvGrpSpPr>
-      <p:grpSpPr>
-        <a:xfrm>
-          <a:off x="0" y="0"/>
-          <a:ext cx="0" cy="0"/>
-          <a:chOff x="0" y="0"/>
-          <a:chExt cx="0" cy="0"/>
-        </a:xfrm>
-      </p:grpSpPr>
-      <p:sp>
-        <p:nvSpPr>
-          <p:cNvPr id="5" name="Title 4">
-            <a:extLst>
-              <a:ext uri="{FF2B5EF4-FFF2-40B4-BE49-F238E27FC236}">
-                <a16:creationId xmlns:a16="http://schemas.microsoft.com/office/drawing/2014/main" id="{475E9C6B-D357-4170-A190-77D3BE5E3D88}"/>
-              </a:ext>
-            </a:extLst>
-          </p:cNvPr>
-          <p:cNvSpPr>
-            <a:spLocks noGrp="1"/>
-          </p:cNvSpPr>
-          <p:nvPr>
-            <p:ph type="title"/>
-          </p:nvPr>
-        </p:nvSpPr>
-        <p:spPr/>
-        <p:txBody>
-          <a:bodyPr anchor="ctr"/>
-          <a:lstStyle/>
-          <a:p>
-            <a:pPr algn="ctr"/>
-            <a:r>
-              <a:rPr lang="en-GB" b="1" dirty="0">
-                <a:solidFill>
-                  <a:schemeClr val="tx1">
-                    <a:lumMod val="95000"/>
-                    <a:lumOff val="5000"/>
-                  </a:schemeClr>
-                </a:solidFill>
-              </a:rPr>
-              <a:t>Schedule Polling Process</a:t>
-            </a:r>
-            <a:endParaRPr lang="en-SG" b="1" dirty="0">
-              <a:solidFill>
-                <a:schemeClr val="tx1">
-                  <a:lumMod val="95000"/>
-                  <a:lumOff val="5000"/>
-                </a:schemeClr>
-              </a:solidFill>
-            </a:endParaRPr>
-          </a:p>
-        </p:txBody>
-      </p:sp>
-      <p:sp>
-        <p:nvSpPr>
-          <p:cNvPr id="6" name="Text Placeholder 5">
-            <a:extLst>
-              <a:ext uri="{FF2B5EF4-FFF2-40B4-BE49-F238E27FC236}">
-                <a16:creationId xmlns:a16="http://schemas.microsoft.com/office/drawing/2014/main" id="{A643C0C4-4A5D-478F-87B9-06120B4AF779}"/>
-              </a:ext>
-            </a:extLst>
-          </p:cNvPr>
-          <p:cNvSpPr>
-            <a:spLocks noGrp="1"/>
-          </p:cNvSpPr>
-          <p:nvPr>
-            <p:ph type="body" idx="1"/>
-          </p:nvPr>
-        </p:nvSpPr>
-        <p:spPr/>
-        <p:txBody>
-          <a:bodyPr/>
-          <a:lstStyle/>
-          <a:p>
-            <a:endParaRPr lang="en-SG"/>
-          </a:p>
-        </p:txBody>
-      </p:sp>
-    </p:spTree>
-    <p:extLst>
-      <p:ext uri="{BB962C8B-B14F-4D97-AF65-F5344CB8AC3E}">
-        <p14:creationId xmlns:p14="http://schemas.microsoft.com/office/powerpoint/2010/main" val="2363839823"/>
-      </p:ext>
-    </p:extLst>
-  </p:cSld>
-  <p:clrMapOvr>
-    <a:masterClrMapping/>
-  </p:clrMapOvr>
-</p:sld>
-</file>
-
 <file path=ppt/slides/slide13.xml><?xml version="1.0" encoding="utf-8"?>
 <p:sld xmlns:a="http://schemas.openxmlformats.org/drawingml/2006/main" xmlns:r="http://schemas.openxmlformats.org/officeDocument/2006/relationships" xmlns:p="http://schemas.openxmlformats.org/presentationml/2006/main">
   <p:cSld>
@@ -7152,45 +7153,79 @@
           <a:chExt cx="0" cy="0"/>
         </a:xfrm>
       </p:grpSpPr>
-      <p:pic>
-        <p:nvPicPr>
-          <p:cNvPr id="5" name="Picture 4">
-            <a:extLst>
-              <a:ext uri="{FF2B5EF4-FFF2-40B4-BE49-F238E27FC236}">
-                <a16:creationId xmlns:a16="http://schemas.microsoft.com/office/drawing/2014/main" id="{CC488ADD-2569-4DA8-8916-3276EF960442}"/>
-              </a:ext>
-            </a:extLst>
-          </p:cNvPr>
-          <p:cNvPicPr>
-            <a:picLocks noChangeAspect="1"/>
-          </p:cNvPicPr>
-          <p:nvPr/>
-        </p:nvPicPr>
-        <p:blipFill rotWithShape="1">
-          <a:blip r:embed="rId2">
-            <a:extLst>
-              <a:ext uri="{28A0092B-C50C-407E-A947-70E740481C1C}">
-                <a14:useLocalDpi xmlns:a14="http://schemas.microsoft.com/office/drawing/2010/main" val="0"/>
-              </a:ext>
-            </a:extLst>
-          </a:blip>
-          <a:srcRect l="2772" r="39726" b="62500"/>
-          <a:stretch/>
-        </p:blipFill>
-        <p:spPr>
-          <a:xfrm>
-            <a:off x="955129" y="1327355"/>
-            <a:ext cx="10281742" cy="4203290"/>
-          </a:xfrm>
-          <a:prstGeom prst="rect">
-            <a:avLst/>
-          </a:prstGeom>
-        </p:spPr>
-      </p:pic>
+      <p:sp>
+        <p:nvSpPr>
+          <p:cNvPr id="5" name="Title 4">
+            <a:extLst>
+              <a:ext uri="{FF2B5EF4-FFF2-40B4-BE49-F238E27FC236}">
+                <a16:creationId xmlns:a16="http://schemas.microsoft.com/office/drawing/2014/main" id="{475E9C6B-D357-4170-A190-77D3BE5E3D88}"/>
+              </a:ext>
+            </a:extLst>
+          </p:cNvPr>
+          <p:cNvSpPr>
+            <a:spLocks noGrp="1"/>
+          </p:cNvSpPr>
+          <p:nvPr>
+            <p:ph type="title"/>
+          </p:nvPr>
+        </p:nvSpPr>
+        <p:spPr/>
+        <p:txBody>
+          <a:bodyPr anchor="ctr"/>
+          <a:lstStyle/>
+          <a:p>
+            <a:pPr algn="ctr"/>
+            <a:r>
+              <a:rPr lang="en-GB" b="1" dirty="0">
+                <a:solidFill>
+                  <a:schemeClr val="tx1">
+                    <a:lumMod val="95000"/>
+                    <a:lumOff val="5000"/>
+                  </a:schemeClr>
+                </a:solidFill>
+              </a:rPr>
+              <a:t>Schedule Polling Process</a:t>
+            </a:r>
+            <a:endParaRPr lang="en-SG" b="1" dirty="0">
+              <a:solidFill>
+                <a:schemeClr val="tx1">
+                  <a:lumMod val="95000"/>
+                  <a:lumOff val="5000"/>
+                </a:schemeClr>
+              </a:solidFill>
+            </a:endParaRPr>
+          </a:p>
+        </p:txBody>
+      </p:sp>
+      <p:sp>
+        <p:nvSpPr>
+          <p:cNvPr id="6" name="Text Placeholder 5">
+            <a:extLst>
+              <a:ext uri="{FF2B5EF4-FFF2-40B4-BE49-F238E27FC236}">
+                <a16:creationId xmlns:a16="http://schemas.microsoft.com/office/drawing/2014/main" id="{A643C0C4-4A5D-478F-87B9-06120B4AF779}"/>
+              </a:ext>
+            </a:extLst>
+          </p:cNvPr>
+          <p:cNvSpPr>
+            <a:spLocks noGrp="1"/>
+          </p:cNvSpPr>
+          <p:nvPr>
+            <p:ph type="body" idx="1"/>
+          </p:nvPr>
+        </p:nvSpPr>
+        <p:spPr/>
+        <p:txBody>
+          <a:bodyPr/>
+          <a:lstStyle/>
+          <a:p>
+            <a:endParaRPr lang="en-SG"/>
+          </a:p>
+        </p:txBody>
+      </p:sp>
     </p:spTree>
     <p:extLst>
       <p:ext uri="{BB962C8B-B14F-4D97-AF65-F5344CB8AC3E}">
-        <p14:creationId xmlns:p14="http://schemas.microsoft.com/office/powerpoint/2010/main" val="892281738"/>
+        <p14:creationId xmlns:p14="http://schemas.microsoft.com/office/powerpoint/2010/main" val="2363839823"/>
       </p:ext>
     </p:extLst>
   </p:cSld>
@@ -7217,6 +7252,71 @@
           <a:chExt cx="0" cy="0"/>
         </a:xfrm>
       </p:grpSpPr>
+      <p:pic>
+        <p:nvPicPr>
+          <p:cNvPr id="5" name="Picture 4">
+            <a:extLst>
+              <a:ext uri="{FF2B5EF4-FFF2-40B4-BE49-F238E27FC236}">
+                <a16:creationId xmlns:a16="http://schemas.microsoft.com/office/drawing/2014/main" id="{CC488ADD-2569-4DA8-8916-3276EF960442}"/>
+              </a:ext>
+            </a:extLst>
+          </p:cNvPr>
+          <p:cNvPicPr>
+            <a:picLocks noChangeAspect="1"/>
+          </p:cNvPicPr>
+          <p:nvPr/>
+        </p:nvPicPr>
+        <p:blipFill rotWithShape="1">
+          <a:blip r:embed="rId2">
+            <a:extLst>
+              <a:ext uri="{28A0092B-C50C-407E-A947-70E740481C1C}">
+                <a14:useLocalDpi xmlns:a14="http://schemas.microsoft.com/office/drawing/2010/main" val="0"/>
+              </a:ext>
+            </a:extLst>
+          </a:blip>
+          <a:srcRect l="2772" r="39726" b="62500"/>
+          <a:stretch/>
+        </p:blipFill>
+        <p:spPr>
+          <a:xfrm>
+            <a:off x="955129" y="1327355"/>
+            <a:ext cx="10281742" cy="4203290"/>
+          </a:xfrm>
+          <a:prstGeom prst="rect">
+            <a:avLst/>
+          </a:prstGeom>
+        </p:spPr>
+      </p:pic>
+    </p:spTree>
+    <p:extLst>
+      <p:ext uri="{BB962C8B-B14F-4D97-AF65-F5344CB8AC3E}">
+        <p14:creationId xmlns:p14="http://schemas.microsoft.com/office/powerpoint/2010/main" val="892281738"/>
+      </p:ext>
+    </p:extLst>
+  </p:cSld>
+  <p:clrMapOvr>
+    <a:masterClrMapping/>
+  </p:clrMapOvr>
+</p:sld>
+</file>
+
+<file path=ppt/slides/slide15.xml><?xml version="1.0" encoding="utf-8"?>
+<p:sld xmlns:a="http://schemas.openxmlformats.org/drawingml/2006/main" xmlns:r="http://schemas.openxmlformats.org/officeDocument/2006/relationships" xmlns:p="http://schemas.openxmlformats.org/presentationml/2006/main">
+  <p:cSld>
+    <p:spTree>
+      <p:nvGrpSpPr>
+        <p:cNvPr id="1" name=""/>
+        <p:cNvGrpSpPr/>
+        <p:nvPr/>
+      </p:nvGrpSpPr>
+      <p:grpSpPr>
+        <a:xfrm>
+          <a:off x="0" y="0"/>
+          <a:ext cx="0" cy="0"/>
+          <a:chOff x="0" y="0"/>
+          <a:chExt cx="0" cy="0"/>
+        </a:xfrm>
+      </p:grpSpPr>
       <p:sp>
         <p:nvSpPr>
           <p:cNvPr id="4" name="Rectangle 3">
@@ -8932,7 +9032,7 @@
 </p:sld>
 </file>
 
-<file path=ppt/slides/slide15.xml><?xml version="1.0" encoding="utf-8"?>
+<file path=ppt/slides/slide16.xml><?xml version="1.0" encoding="utf-8"?>
 <p:sld xmlns:a="http://schemas.openxmlformats.org/drawingml/2006/main" xmlns:r="http://schemas.openxmlformats.org/officeDocument/2006/relationships" xmlns:p="http://schemas.openxmlformats.org/presentationml/2006/main">
   <p:cSld>
     <p:spTree>
@@ -11586,6 +11686,154 @@
           <a:chExt cx="0" cy="0"/>
         </a:xfrm>
       </p:grpSpPr>
+      <p:grpSp>
+        <p:nvGrpSpPr>
+          <p:cNvPr id="9" name="Group 8">
+            <a:extLst>
+              <a:ext uri="{FF2B5EF4-FFF2-40B4-BE49-F238E27FC236}">
+                <a16:creationId xmlns:a16="http://schemas.microsoft.com/office/drawing/2014/main" id="{4EEE2C85-04D9-45DC-B97D-5F6BD28CECE8}"/>
+              </a:ext>
+            </a:extLst>
+          </p:cNvPr>
+          <p:cNvGrpSpPr/>
+          <p:nvPr/>
+        </p:nvGrpSpPr>
+        <p:grpSpPr>
+          <a:xfrm>
+            <a:off x="2924985" y="290945"/>
+            <a:ext cx="6342031" cy="6390218"/>
+            <a:chOff x="2321677" y="290945"/>
+            <a:chExt cx="6342031" cy="6390218"/>
+          </a:xfrm>
+        </p:grpSpPr>
+        <p:pic>
+          <p:nvPicPr>
+            <p:cNvPr id="8" name="Picture 7">
+              <a:extLst>
+                <a:ext uri="{FF2B5EF4-FFF2-40B4-BE49-F238E27FC236}">
+                  <a16:creationId xmlns:a16="http://schemas.microsoft.com/office/drawing/2014/main" id="{4CAF6BFF-2B09-4009-9BD6-197BD924AA17}"/>
+                </a:ext>
+              </a:extLst>
+            </p:cNvPr>
+            <p:cNvPicPr>
+              <a:picLocks noChangeAspect="1"/>
+            </p:cNvPicPr>
+            <p:nvPr/>
+          </p:nvPicPr>
+          <p:blipFill rotWithShape="1">
+            <a:blip r:embed="rId2">
+              <a:extLst>
+                <a:ext uri="{28A0092B-C50C-407E-A947-70E740481C1C}">
+                  <a14:useLocalDpi xmlns:a14="http://schemas.microsoft.com/office/drawing/2010/main" val="0"/>
+                </a:ext>
+              </a:extLst>
+            </a:blip>
+            <a:srcRect l="6226" t="1312" r="67433" b="46183"/>
+            <a:stretch/>
+          </p:blipFill>
+          <p:spPr>
+            <a:xfrm>
+              <a:off x="3785521" y="596965"/>
+              <a:ext cx="3344952" cy="4126889"/>
+            </a:xfrm>
+            <a:prstGeom prst="rect">
+              <a:avLst/>
+            </a:prstGeom>
+          </p:spPr>
+        </p:pic>
+        <p:sp>
+          <p:nvSpPr>
+            <p:cNvPr id="3" name="Rectangle 2">
+              <a:extLst>
+                <a:ext uri="{FF2B5EF4-FFF2-40B4-BE49-F238E27FC236}">
+                  <a16:creationId xmlns:a16="http://schemas.microsoft.com/office/drawing/2014/main" id="{762209CA-ABF2-4488-A6B7-3DFAF0CE361D}"/>
+                </a:ext>
+              </a:extLst>
+            </p:cNvPr>
+            <p:cNvSpPr/>
+            <p:nvPr/>
+          </p:nvSpPr>
+          <p:spPr>
+            <a:xfrm>
+              <a:off x="2321677" y="290945"/>
+              <a:ext cx="6342031" cy="6390218"/>
+            </a:xfrm>
+            <a:prstGeom prst="rect">
+              <a:avLst/>
+            </a:prstGeom>
+            <a:blipFill>
+              <a:blip r:embed="rId3">
+                <a:alphaModFix amt="45000"/>
+                <a:extLst>
+                  <a:ext uri="{837473B0-CC2E-450A-ABE3-18F120FF3D39}">
+                    <a1611:picAttrSrcUrl xmlns:a1611="http://schemas.microsoft.com/office/drawing/2016/11/main" r:id="rId4"/>
+                  </a:ext>
+                </a:extLst>
+              </a:blip>
+              <a:stretch>
+                <a:fillRect t="-1924" b="-7113"/>
+              </a:stretch>
+            </a:blipFill>
+            <a:ln>
+              <a:noFill/>
+            </a:ln>
+          </p:spPr>
+          <p:style>
+            <a:lnRef idx="2">
+              <a:schemeClr val="accent1">
+                <a:shade val="50000"/>
+              </a:schemeClr>
+            </a:lnRef>
+            <a:fillRef idx="1">
+              <a:schemeClr val="accent1"/>
+            </a:fillRef>
+            <a:effectRef idx="0">
+              <a:schemeClr val="accent1"/>
+            </a:effectRef>
+            <a:fontRef idx="minor">
+              <a:schemeClr val="lt1"/>
+            </a:fontRef>
+          </p:style>
+          <p:txBody>
+            <a:bodyPr rtlCol="0" anchor="ctr"/>
+            <a:lstStyle/>
+            <a:p>
+              <a:pPr algn="ctr"/>
+              <a:endParaRPr lang="en-SG"/>
+            </a:p>
+          </p:txBody>
+        </p:sp>
+      </p:grpSp>
+    </p:spTree>
+    <p:extLst>
+      <p:ext uri="{BB962C8B-B14F-4D97-AF65-F5344CB8AC3E}">
+        <p14:creationId xmlns:p14="http://schemas.microsoft.com/office/powerpoint/2010/main" val="511904048"/>
+      </p:ext>
+    </p:extLst>
+  </p:cSld>
+  <p:clrMapOvr>
+    <a:masterClrMapping/>
+  </p:clrMapOvr>
+</p:sld>
+</file>
+
+<file path=ppt/slides/slide9.xml><?xml version="1.0" encoding="utf-8"?>
+<p:sld xmlns:a="http://schemas.openxmlformats.org/drawingml/2006/main" xmlns:r="http://schemas.openxmlformats.org/officeDocument/2006/relationships" xmlns:p="http://schemas.openxmlformats.org/presentationml/2006/main">
+  <p:cSld>
+    <p:spTree>
+      <p:nvGrpSpPr>
+        <p:cNvPr id="1" name=""/>
+        <p:cNvGrpSpPr/>
+        <p:nvPr/>
+      </p:nvGrpSpPr>
+      <p:grpSpPr>
+        <a:xfrm>
+          <a:off x="0" y="0"/>
+          <a:ext cx="0" cy="0"/>
+          <a:chOff x="0" y="0"/>
+          <a:chExt cx="0" cy="0"/>
+        </a:xfrm>
+      </p:grpSpPr>
       <p:sp>
         <p:nvSpPr>
           <p:cNvPr id="4" name="Rectangle 3">
@@ -13389,105 +13637,6 @@
     <p:extLst>
       <p:ext uri="{BB962C8B-B14F-4D97-AF65-F5344CB8AC3E}">
         <p14:creationId xmlns:p14="http://schemas.microsoft.com/office/powerpoint/2010/main" val="2694536737"/>
-      </p:ext>
-    </p:extLst>
-  </p:cSld>
-  <p:clrMapOvr>
-    <a:masterClrMapping/>
-  </p:clrMapOvr>
-</p:sld>
-</file>
-
-<file path=ppt/slides/slide9.xml><?xml version="1.0" encoding="utf-8"?>
-<p:sld xmlns:a="http://schemas.openxmlformats.org/drawingml/2006/main" xmlns:r="http://schemas.openxmlformats.org/officeDocument/2006/relationships" xmlns:p="http://schemas.openxmlformats.org/presentationml/2006/main">
-  <p:cSld>
-    <p:spTree>
-      <p:nvGrpSpPr>
-        <p:cNvPr id="1" name=""/>
-        <p:cNvGrpSpPr/>
-        <p:nvPr/>
-      </p:nvGrpSpPr>
-      <p:grpSpPr>
-        <a:xfrm>
-          <a:off x="0" y="0"/>
-          <a:ext cx="0" cy="0"/>
-          <a:chOff x="0" y="0"/>
-          <a:chExt cx="0" cy="0"/>
-        </a:xfrm>
-      </p:grpSpPr>
-      <p:sp>
-        <p:nvSpPr>
-          <p:cNvPr id="5" name="Title 4">
-            <a:extLst>
-              <a:ext uri="{FF2B5EF4-FFF2-40B4-BE49-F238E27FC236}">
-                <a16:creationId xmlns:a16="http://schemas.microsoft.com/office/drawing/2014/main" id="{475E9C6B-D357-4170-A190-77D3BE5E3D88}"/>
-              </a:ext>
-            </a:extLst>
-          </p:cNvPr>
-          <p:cNvSpPr>
-            <a:spLocks noGrp="1"/>
-          </p:cNvSpPr>
-          <p:nvPr>
-            <p:ph type="title"/>
-          </p:nvPr>
-        </p:nvSpPr>
-        <p:spPr/>
-        <p:txBody>
-          <a:bodyPr anchor="ctr"/>
-          <a:lstStyle/>
-          <a:p>
-            <a:pPr algn="ctr"/>
-            <a:r>
-              <a:rPr lang="en-GB" b="1" dirty="0">
-                <a:solidFill>
-                  <a:schemeClr val="tx1">
-                    <a:lumMod val="95000"/>
-                    <a:lumOff val="5000"/>
-                  </a:schemeClr>
-                </a:solidFill>
-              </a:rPr>
-              <a:t>Weather Reporting Process</a:t>
-            </a:r>
-            <a:endParaRPr lang="en-SG" dirty="0">
-              <a:solidFill>
-                <a:schemeClr val="tx1">
-                  <a:lumMod val="95000"/>
-                  <a:lumOff val="5000"/>
-                </a:schemeClr>
-              </a:solidFill>
-            </a:endParaRPr>
-          </a:p>
-        </p:txBody>
-      </p:sp>
-      <p:sp>
-        <p:nvSpPr>
-          <p:cNvPr id="6" name="Text Placeholder 5">
-            <a:extLst>
-              <a:ext uri="{FF2B5EF4-FFF2-40B4-BE49-F238E27FC236}">
-                <a16:creationId xmlns:a16="http://schemas.microsoft.com/office/drawing/2014/main" id="{A643C0C4-4A5D-478F-87B9-06120B4AF779}"/>
-              </a:ext>
-            </a:extLst>
-          </p:cNvPr>
-          <p:cNvSpPr>
-            <a:spLocks noGrp="1"/>
-          </p:cNvSpPr>
-          <p:nvPr>
-            <p:ph type="body" idx="1"/>
-          </p:nvPr>
-        </p:nvSpPr>
-        <p:spPr/>
-        <p:txBody>
-          <a:bodyPr/>
-          <a:lstStyle/>
-          <a:p>
-            <a:endParaRPr lang="en-SG"/>
-          </a:p>
-        </p:txBody>
-      </p:sp>
-    </p:spTree>
-    <p:extLst>
-      <p:ext uri="{BB962C8B-B14F-4D97-AF65-F5344CB8AC3E}">
-        <p14:creationId xmlns:p14="http://schemas.microsoft.com/office/powerpoint/2010/main" val="376642483"/>
       </p:ext>
     </p:extLst>
   </p:cSld>

</xml_diff>

<commit_message>
Minor Changes to Doc and EI Presentation
Minor Changes to Doc and EI Presentation
</commit_message>
<xml_diff>
--- a/EI Presentation.pptx
+++ b/EI Presentation.pptx
@@ -5,7 +5,7 @@
     <p:sldMasterId id="2147483672" r:id="rId1"/>
   </p:sldMasterIdLst>
   <p:notesMasterIdLst>
-    <p:notesMasterId r:id="rId18"/>
+    <p:notesMasterId r:id="rId20"/>
   </p:notesMasterIdLst>
   <p:sldIdLst>
     <p:sldId id="258" r:id="rId2"/>
@@ -23,7 +23,9 @@
     <p:sldId id="266" r:id="rId14"/>
     <p:sldId id="271" r:id="rId15"/>
     <p:sldId id="274" r:id="rId16"/>
-    <p:sldId id="261" r:id="rId17"/>
+    <p:sldId id="276" r:id="rId17"/>
+    <p:sldId id="277" r:id="rId18"/>
+    <p:sldId id="261" r:id="rId19"/>
   </p:sldIdLst>
   <p:sldSz cx="12192000" cy="6858000"/>
   <p:notesSz cx="6858000" cy="9144000"/>
@@ -143,249 +145,10 @@
   <pc:docChgLst>
     <pc:chgData name=" " userId="f0093c6c-aad3-47c8-981f-e49faae5c851" providerId="ADAL" clId="{3552CE5B-0803-49BD-A011-F4C75B92F40C}"/>
     <pc:docChg chg="undo custSel addSld delSld modSld sldOrd modMainMaster">
-      <pc:chgData name=" " userId="f0093c6c-aad3-47c8-981f-e49faae5c851" providerId="ADAL" clId="{3552CE5B-0803-49BD-A011-F4C75B92F40C}" dt="2018-03-27T00:38:41.445" v="1344"/>
+      <pc:chgData name=" " userId="f0093c6c-aad3-47c8-981f-e49faae5c851" providerId="ADAL" clId="{3552CE5B-0803-49BD-A011-F4C75B92F40C}" dt="2018-03-30T07:15:40.962" v="1416" actId="20577"/>
       <pc:docMkLst>
         <pc:docMk/>
       </pc:docMkLst>
-      <pc:sldChg chg="addSp delSp modSp add del setBg">
-        <pc:chgData name=" " userId="f0093c6c-aad3-47c8-981f-e49faae5c851" providerId="ADAL" clId="{3552CE5B-0803-49BD-A011-F4C75B92F40C}" dt="2018-03-21T13:18:13.035" v="1323" actId="1076"/>
-        <pc:sldMkLst>
-          <pc:docMk/>
-          <pc:sldMk cId="576619051" sldId="257"/>
-        </pc:sldMkLst>
-        <pc:spChg chg="mod">
-          <ac:chgData name=" " userId="f0093c6c-aad3-47c8-981f-e49faae5c851" providerId="ADAL" clId="{3552CE5B-0803-49BD-A011-F4C75B92F40C}" dt="2018-03-20T15:04:29.094" v="541" actId="1076"/>
-          <ac:spMkLst>
-            <pc:docMk/>
-            <pc:sldMk cId="576619051" sldId="257"/>
-            <ac:spMk id="7" creationId="{1F77A314-7F07-43ED-9FB3-650E3013A58B}"/>
-          </ac:spMkLst>
-        </pc:spChg>
-        <pc:spChg chg="add mod">
-          <ac:chgData name=" " userId="f0093c6c-aad3-47c8-981f-e49faae5c851" providerId="ADAL" clId="{3552CE5B-0803-49BD-A011-F4C75B92F40C}" dt="2018-03-21T12:28:17.885" v="719" actId="1035"/>
-          <ac:spMkLst>
-            <pc:docMk/>
-            <pc:sldMk cId="576619051" sldId="257"/>
-            <ac:spMk id="22" creationId="{F452B85E-2C2B-4F80-849E-10AE3017896B}"/>
-          </ac:spMkLst>
-        </pc:spChg>
-        <pc:spChg chg="add del">
-          <ac:chgData name=" " userId="f0093c6c-aad3-47c8-981f-e49faae5c851" providerId="ADAL" clId="{3552CE5B-0803-49BD-A011-F4C75B92F40C}" dt="2018-03-20T15:15:15.490" v="651" actId="478"/>
-          <ac:spMkLst>
-            <pc:docMk/>
-            <pc:sldMk cId="576619051" sldId="257"/>
-            <ac:spMk id="24" creationId="{CBA61B15-7507-46A2-877B-F16EE241DB2F}"/>
-          </ac:spMkLst>
-        </pc:spChg>
-        <pc:spChg chg="mod">
-          <ac:chgData name=" " userId="f0093c6c-aad3-47c8-981f-e49faae5c851" providerId="ADAL" clId="{3552CE5B-0803-49BD-A011-F4C75B92F40C}" dt="2018-03-20T15:00:25.150" v="419" actId="1076"/>
-          <ac:spMkLst>
-            <pc:docMk/>
-            <pc:sldMk cId="576619051" sldId="257"/>
-            <ac:spMk id="42" creationId="{5EFE54E3-B97B-46C7-92AF-B57445685AEF}"/>
-          </ac:spMkLst>
-        </pc:spChg>
-        <pc:spChg chg="mod">
-          <ac:chgData name=" " userId="f0093c6c-aad3-47c8-981f-e49faae5c851" providerId="ADAL" clId="{3552CE5B-0803-49BD-A011-F4C75B92F40C}" dt="2018-03-20T15:01:48.193" v="475" actId="1076"/>
-          <ac:spMkLst>
-            <pc:docMk/>
-            <pc:sldMk cId="576619051" sldId="257"/>
-            <ac:spMk id="77" creationId="{F218D09A-16CE-4C90-8245-440D8FA85A8E}"/>
-          </ac:spMkLst>
-        </pc:spChg>
-        <pc:spChg chg="add del mod">
-          <ac:chgData name=" " userId="f0093c6c-aad3-47c8-981f-e49faae5c851" providerId="ADAL" clId="{3552CE5B-0803-49BD-A011-F4C75B92F40C}" dt="2018-03-20T15:04:37.472" v="558" actId="478"/>
-          <ac:spMkLst>
-            <pc:docMk/>
-            <pc:sldMk cId="576619051" sldId="257"/>
-            <ac:spMk id="85" creationId="{5E89F899-F3C9-4041-92B8-73C54C9F3D86}"/>
-          </ac:spMkLst>
-        </pc:spChg>
-        <pc:spChg chg="add mod">
-          <ac:chgData name=" " userId="f0093c6c-aad3-47c8-981f-e49faae5c851" providerId="ADAL" clId="{3552CE5B-0803-49BD-A011-F4C75B92F40C}" dt="2018-03-21T12:31:30.068" v="722" actId="1076"/>
-          <ac:spMkLst>
-            <pc:docMk/>
-            <pc:sldMk cId="576619051" sldId="257"/>
-            <ac:spMk id="86" creationId="{67B06CD6-B30B-433F-B7F9-DFBCAB4C25B7}"/>
-          </ac:spMkLst>
-        </pc:spChg>
-        <pc:spChg chg="add mod">
-          <ac:chgData name=" " userId="f0093c6c-aad3-47c8-981f-e49faae5c851" providerId="ADAL" clId="{3552CE5B-0803-49BD-A011-F4C75B92F40C}" dt="2018-03-21T13:18:13.035" v="1323" actId="1076"/>
-          <ac:spMkLst>
-            <pc:docMk/>
-            <pc:sldMk cId="576619051" sldId="257"/>
-            <ac:spMk id="90" creationId="{A1203CBF-C39E-4F79-B3AB-E4DF753A030D}"/>
-          </ac:spMkLst>
-        </pc:spChg>
-        <pc:spChg chg="add mod">
-          <ac:chgData name=" " userId="f0093c6c-aad3-47c8-981f-e49faae5c851" providerId="ADAL" clId="{3552CE5B-0803-49BD-A011-F4C75B92F40C}" dt="2018-03-21T12:32:53.213" v="752" actId="1076"/>
-          <ac:spMkLst>
-            <pc:docMk/>
-            <pc:sldMk cId="576619051" sldId="257"/>
-            <ac:spMk id="93" creationId="{7D817DD0-38EA-49F7-824C-6B583CCF7067}"/>
-          </ac:spMkLst>
-        </pc:spChg>
-        <pc:spChg chg="add mod">
-          <ac:chgData name=" " userId="f0093c6c-aad3-47c8-981f-e49faae5c851" providerId="ADAL" clId="{3552CE5B-0803-49BD-A011-F4C75B92F40C}" dt="2018-03-21T12:31:38.176" v="724" actId="1076"/>
-          <ac:spMkLst>
-            <pc:docMk/>
-            <pc:sldMk cId="576619051" sldId="257"/>
-            <ac:spMk id="97" creationId="{F4341F03-C1DD-4D29-9EFA-3090DED0513B}"/>
-          </ac:spMkLst>
-        </pc:spChg>
-        <pc:spChg chg="mod">
-          <ac:chgData name=" " userId="f0093c6c-aad3-47c8-981f-e49faae5c851" providerId="ADAL" clId="{3552CE5B-0803-49BD-A011-F4C75B92F40C}" dt="2018-03-20T15:01:19.893" v="472" actId="1076"/>
-          <ac:spMkLst>
-            <pc:docMk/>
-            <pc:sldMk cId="576619051" sldId="257"/>
-            <ac:spMk id="140" creationId="{DDA851CD-7CD0-4EE8-8906-9B27D82E6E44}"/>
-          </ac:spMkLst>
-        </pc:spChg>
-        <pc:spChg chg="mod">
-          <ac:chgData name=" " userId="f0093c6c-aad3-47c8-981f-e49faae5c851" providerId="ADAL" clId="{3552CE5B-0803-49BD-A011-F4C75B92F40C}" dt="2018-03-20T15:01:09.033" v="470" actId="1076"/>
-          <ac:spMkLst>
-            <pc:docMk/>
-            <pc:sldMk cId="576619051" sldId="257"/>
-            <ac:spMk id="147" creationId="{57592175-5584-4596-8F43-35BBEA6DCF28}"/>
-          </ac:spMkLst>
-        </pc:spChg>
-        <pc:spChg chg="mod">
-          <ac:chgData name=" " userId="f0093c6c-aad3-47c8-981f-e49faae5c851" providerId="ADAL" clId="{3552CE5B-0803-49BD-A011-F4C75B92F40C}" dt="2018-03-20T15:01:15.477" v="471" actId="1076"/>
-          <ac:spMkLst>
-            <pc:docMk/>
-            <pc:sldMk cId="576619051" sldId="257"/>
-            <ac:spMk id="148" creationId="{CCD4D169-0F64-42FC-961F-84D2AD996A12}"/>
-          </ac:spMkLst>
-        </pc:spChg>
-        <pc:spChg chg="mod">
-          <ac:chgData name=" " userId="f0093c6c-aad3-47c8-981f-e49faae5c851" providerId="ADAL" clId="{3552CE5B-0803-49BD-A011-F4C75B92F40C}" dt="2018-03-21T12:32:12.250" v="740" actId="1076"/>
-          <ac:spMkLst>
-            <pc:docMk/>
-            <pc:sldMk cId="576619051" sldId="257"/>
-            <ac:spMk id="149" creationId="{0253AB35-29F0-465C-B472-8980F74A41D8}"/>
-          </ac:spMkLst>
-        </pc:spChg>
-        <pc:grpChg chg="mod">
-          <ac:chgData name=" " userId="f0093c6c-aad3-47c8-981f-e49faae5c851" providerId="ADAL" clId="{3552CE5B-0803-49BD-A011-F4C75B92F40C}" dt="2018-03-20T15:04:32.641" v="552" actId="1036"/>
-          <ac:grpSpMkLst>
-            <pc:docMk/>
-            <pc:sldMk cId="576619051" sldId="257"/>
-            <ac:grpSpMk id="19" creationId="{0178F462-CA38-4F38-9809-B45A2C3C17C6}"/>
-          </ac:grpSpMkLst>
-        </pc:grpChg>
-        <pc:grpChg chg="mod">
-          <ac:chgData name=" " userId="f0093c6c-aad3-47c8-981f-e49faae5c851" providerId="ADAL" clId="{3552CE5B-0803-49BD-A011-F4C75B92F40C}" dt="2018-03-20T15:05:14.247" v="570" actId="1036"/>
-          <ac:grpSpMkLst>
-            <pc:docMk/>
-            <pc:sldMk cId="576619051" sldId="257"/>
-            <ac:grpSpMk id="56" creationId="{7976C5A8-5D8B-4FD0-93EF-0F0696FB09CF}"/>
-          </ac:grpSpMkLst>
-        </pc:grpChg>
-        <pc:grpChg chg="mod">
-          <ac:chgData name=" " userId="f0093c6c-aad3-47c8-981f-e49faae5c851" providerId="ADAL" clId="{3552CE5B-0803-49BD-A011-F4C75B92F40C}" dt="2018-03-20T15:05:27.896" v="572" actId="1076"/>
-          <ac:grpSpMkLst>
-            <pc:docMk/>
-            <pc:sldMk cId="576619051" sldId="257"/>
-            <ac:grpSpMk id="68" creationId="{2ED2848E-3EEE-4C32-AAB3-285C6C487E43}"/>
-          </ac:grpSpMkLst>
-        </pc:grpChg>
-        <pc:picChg chg="mod">
-          <ac:chgData name=" " userId="f0093c6c-aad3-47c8-981f-e49faae5c851" providerId="ADAL" clId="{3552CE5B-0803-49BD-A011-F4C75B92F40C}" dt="2018-03-20T15:04:29.056" v="540" actId="1076"/>
-          <ac:picMkLst>
-            <pc:docMk/>
-            <pc:sldMk cId="576619051" sldId="257"/>
-            <ac:picMk id="6" creationId="{6853ACC9-E91F-474F-A9EB-35A697F18027}"/>
-          </ac:picMkLst>
-        </pc:picChg>
-        <pc:picChg chg="mod">
-          <ac:chgData name=" " userId="f0093c6c-aad3-47c8-981f-e49faae5c851" providerId="ADAL" clId="{3552CE5B-0803-49BD-A011-F4C75B92F40C}" dt="2018-03-20T15:04:28.210" v="539" actId="1076"/>
-          <ac:picMkLst>
-            <pc:docMk/>
-            <pc:sldMk cId="576619051" sldId="257"/>
-            <ac:picMk id="15" creationId="{E7CC8C3B-F989-4E63-AD36-1A2FF00F5FC6}"/>
-          </ac:picMkLst>
-        </pc:picChg>
-        <pc:picChg chg="mod">
-          <ac:chgData name=" " userId="f0093c6c-aad3-47c8-981f-e49faae5c851" providerId="ADAL" clId="{3552CE5B-0803-49BD-A011-F4C75B92F40C}" dt="2018-03-21T12:33:02.021" v="753" actId="1076"/>
-          <ac:picMkLst>
-            <pc:docMk/>
-            <pc:sldMk cId="576619051" sldId="257"/>
-            <ac:picMk id="40" creationId="{03FCBB63-BDD0-446C-B047-E83EFCDC97A8}"/>
-          </ac:picMkLst>
-        </pc:picChg>
-        <pc:picChg chg="add del mod">
-          <ac:chgData name=" " userId="f0093c6c-aad3-47c8-981f-e49faae5c851" providerId="ADAL" clId="{3552CE5B-0803-49BD-A011-F4C75B92F40C}" dt="2018-03-20T15:02:23.031" v="482" actId="478"/>
-          <ac:picMkLst>
-            <pc:docMk/>
-            <pc:sldMk cId="576619051" sldId="257"/>
-            <ac:picMk id="84" creationId="{0EB33E38-2CCA-4F01-B53C-E062D5C52F5F}"/>
-          </ac:picMkLst>
-        </pc:picChg>
-        <pc:picChg chg="mod">
-          <ac:chgData name=" " userId="f0093c6c-aad3-47c8-981f-e49faae5c851" providerId="ADAL" clId="{3552CE5B-0803-49BD-A011-F4C75B92F40C}" dt="2018-03-20T15:05:31.561" v="573" actId="14100"/>
-          <ac:picMkLst>
-            <pc:docMk/>
-            <pc:sldMk cId="576619051" sldId="257"/>
-            <ac:picMk id="94" creationId="{E0D478CB-B89A-4C86-BF92-6CA3E15B285B}"/>
-          </ac:picMkLst>
-        </pc:picChg>
-        <pc:picChg chg="add mod">
-          <ac:chgData name=" " userId="f0093c6c-aad3-47c8-981f-e49faae5c851" providerId="ADAL" clId="{3552CE5B-0803-49BD-A011-F4C75B92F40C}" dt="2018-03-21T12:34:34.749" v="758" actId="1076"/>
-          <ac:picMkLst>
-            <pc:docMk/>
-            <pc:sldMk cId="576619051" sldId="257"/>
-            <ac:picMk id="1026" creationId="{6F8AB6F2-8D79-4200-B32D-28344E593C12}"/>
-          </ac:picMkLst>
-        </pc:picChg>
-        <pc:cxnChg chg="add mod">
-          <ac:chgData name=" " userId="f0093c6c-aad3-47c8-981f-e49faae5c851" providerId="ADAL" clId="{3552CE5B-0803-49BD-A011-F4C75B92F40C}" dt="2018-03-21T12:28:17.885" v="719" actId="1035"/>
-          <ac:cxnSpMkLst>
-            <pc:docMk/>
-            <pc:sldMk cId="576619051" sldId="257"/>
-            <ac:cxnSpMk id="3" creationId="{6AE1184F-D094-4872-ABF6-91435FFD48EC}"/>
-          </ac:cxnSpMkLst>
-        </pc:cxnChg>
-        <pc:cxnChg chg="add del mod">
-          <ac:chgData name=" " userId="f0093c6c-aad3-47c8-981f-e49faae5c851" providerId="ADAL" clId="{3552CE5B-0803-49BD-A011-F4C75B92F40C}" dt="2018-03-21T12:32:24.449" v="742" actId="478"/>
-          <ac:cxnSpMkLst>
-            <pc:docMk/>
-            <pc:sldMk cId="576619051" sldId="257"/>
-            <ac:cxnSpMk id="8" creationId="{82A347A7-AE91-4DBB-AB64-1C781D885954}"/>
-          </ac:cxnSpMkLst>
-        </pc:cxnChg>
-        <pc:cxnChg chg="add mod">
-          <ac:chgData name=" " userId="f0093c6c-aad3-47c8-981f-e49faae5c851" providerId="ADAL" clId="{3552CE5B-0803-49BD-A011-F4C75B92F40C}" dt="2018-03-21T12:32:35.160" v="744" actId="13822"/>
-          <ac:cxnSpMkLst>
-            <pc:docMk/>
-            <pc:sldMk cId="576619051" sldId="257"/>
-            <ac:cxnSpMk id="12" creationId="{FB635486-18F7-439F-8CC2-E046A366DEAA}"/>
-          </ac:cxnSpMkLst>
-        </pc:cxnChg>
-        <pc:cxnChg chg="mod">
-          <ac:chgData name=" " userId="f0093c6c-aad3-47c8-981f-e49faae5c851" providerId="ADAL" clId="{3552CE5B-0803-49BD-A011-F4C75B92F40C}" dt="2018-03-20T15:04:33.580" v="556" actId="14100"/>
-          <ac:cxnSpMkLst>
-            <pc:docMk/>
-            <pc:sldMk cId="576619051" sldId="257"/>
-            <ac:cxnSpMk id="18" creationId="{3B890781-4519-431C-8FC6-623DA76406AA}"/>
-          </ac:cxnSpMkLst>
-        </pc:cxnChg>
-        <pc:cxnChg chg="mod">
-          <ac:chgData name=" " userId="f0093c6c-aad3-47c8-981f-e49faae5c851" providerId="ADAL" clId="{3552CE5B-0803-49BD-A011-F4C75B92F40C}" dt="2018-03-20T15:05:14.247" v="570" actId="1036"/>
-          <ac:cxnSpMkLst>
-            <pc:docMk/>
-            <pc:sldMk cId="576619051" sldId="257"/>
-            <ac:cxnSpMk id="62" creationId="{BC547505-418E-4046-8B9C-3E0502ED48FF}"/>
-          </ac:cxnSpMkLst>
-        </pc:cxnChg>
-        <pc:cxnChg chg="mod">
-          <ac:chgData name=" " userId="f0093c6c-aad3-47c8-981f-e49faae5c851" providerId="ADAL" clId="{3552CE5B-0803-49BD-A011-F4C75B92F40C}" dt="2018-03-20T15:05:27.896" v="572" actId="1076"/>
-          <ac:cxnSpMkLst>
-            <pc:docMk/>
-            <pc:sldMk cId="576619051" sldId="257"/>
-            <ac:cxnSpMk id="87" creationId="{648BE510-1903-48E0-933F-79AAA6F27823}"/>
-          </ac:cxnSpMkLst>
-        </pc:cxnChg>
-      </pc:sldChg>
       <pc:sldChg chg="addSp delSp modSp add ord setBg">
         <pc:chgData name=" " userId="f0093c6c-aad3-47c8-981f-e49faae5c851" providerId="ADAL" clId="{3552CE5B-0803-49BD-A011-F4C75B92F40C}" dt="2018-03-27T00:38:41.445" v="1344"/>
         <pc:sldMkLst>
@@ -433,8 +196,8 @@
           </ac:spMkLst>
         </pc:spChg>
       </pc:sldChg>
-      <pc:sldChg chg="modSp add setBg">
-        <pc:chgData name=" " userId="f0093c6c-aad3-47c8-981f-e49faae5c851" providerId="ADAL" clId="{3552CE5B-0803-49BD-A011-F4C75B92F40C}" dt="2018-03-21T12:39:51.831" v="1315" actId="1076"/>
+      <pc:sldChg chg="addSp modSp add setBg">
+        <pc:chgData name=" " userId="f0093c6c-aad3-47c8-981f-e49faae5c851" providerId="ADAL" clId="{3552CE5B-0803-49BD-A011-F4C75B92F40C}" dt="2018-03-30T07:10:28.569" v="1348" actId="1582"/>
         <pc:sldMkLst>
           <pc:docMk/>
           <pc:sldMk cId="3968445112" sldId="259"/>
@@ -453,6 +216,68 @@
             <pc:docMk/>
             <pc:sldMk cId="3968445112" sldId="259"/>
             <ac:spMk id="3" creationId="{3A1AC5E1-BB10-48F6-8A6B-D015713626EE}"/>
+          </ac:spMkLst>
+        </pc:spChg>
+        <pc:spChg chg="add mod">
+          <ac:chgData name=" " userId="f0093c6c-aad3-47c8-981f-e49faae5c851" providerId="ADAL" clId="{3552CE5B-0803-49BD-A011-F4C75B92F40C}" dt="2018-03-30T07:10:28.569" v="1348" actId="1582"/>
+          <ac:spMkLst>
+            <pc:docMk/>
+            <pc:sldMk cId="3968445112" sldId="259"/>
+            <ac:spMk id="3" creationId="{C2DD31CA-0541-4E57-B038-7930A68BFE75}"/>
+          </ac:spMkLst>
+        </pc:spChg>
+      </pc:sldChg>
+      <pc:sldChg chg="addSp delSp modSp add ord">
+        <pc:chgData name=" " userId="f0093c6c-aad3-47c8-981f-e49faae5c851" providerId="ADAL" clId="{3552CE5B-0803-49BD-A011-F4C75B92F40C}" dt="2018-03-30T07:15:28.946" v="1382" actId="20577"/>
+        <pc:sldMkLst>
+          <pc:docMk/>
+          <pc:sldMk cId="1763506197" sldId="276"/>
+        </pc:sldMkLst>
+        <pc:spChg chg="del">
+          <ac:chgData name=" " userId="f0093c6c-aad3-47c8-981f-e49faae5c851" providerId="ADAL" clId="{3552CE5B-0803-49BD-A011-F4C75B92F40C}" dt="2018-03-30T07:13:26.668" v="1351"/>
+          <ac:spMkLst>
+            <pc:docMk/>
+            <pc:sldMk cId="1763506197" sldId="276"/>
+            <ac:spMk id="2" creationId="{5D907628-1FF9-448D-89B3-D6B88700E6B4}"/>
+          </ac:spMkLst>
+        </pc:spChg>
+        <pc:spChg chg="del">
+          <ac:chgData name=" " userId="f0093c6c-aad3-47c8-981f-e49faae5c851" providerId="ADAL" clId="{3552CE5B-0803-49BD-A011-F4C75B92F40C}" dt="2018-03-30T07:13:26.668" v="1351"/>
+          <ac:spMkLst>
+            <pc:docMk/>
+            <pc:sldMk cId="1763506197" sldId="276"/>
+            <ac:spMk id="3" creationId="{B80B57AB-67EC-4165-A26A-AC7D1907A361}"/>
+          </ac:spMkLst>
+        </pc:spChg>
+        <pc:spChg chg="add mod">
+          <ac:chgData name=" " userId="f0093c6c-aad3-47c8-981f-e49faae5c851" providerId="ADAL" clId="{3552CE5B-0803-49BD-A011-F4C75B92F40C}" dt="2018-03-30T07:15:28.946" v="1382" actId="20577"/>
+          <ac:spMkLst>
+            <pc:docMk/>
+            <pc:sldMk cId="1763506197" sldId="276"/>
+            <ac:spMk id="4" creationId="{5A4D4960-C44F-4557-A146-DE7FF1BC4551}"/>
+          </ac:spMkLst>
+        </pc:spChg>
+        <pc:spChg chg="add mod">
+          <ac:chgData name=" " userId="f0093c6c-aad3-47c8-981f-e49faae5c851" providerId="ADAL" clId="{3552CE5B-0803-49BD-A011-F4C75B92F40C}" dt="2018-03-30T07:13:26.668" v="1351"/>
+          <ac:spMkLst>
+            <pc:docMk/>
+            <pc:sldMk cId="1763506197" sldId="276"/>
+            <ac:spMk id="5" creationId="{612B5993-4415-41FC-BB77-1979082721DC}"/>
+          </ac:spMkLst>
+        </pc:spChg>
+      </pc:sldChg>
+      <pc:sldChg chg="modSp add">
+        <pc:chgData name=" " userId="f0093c6c-aad3-47c8-981f-e49faae5c851" providerId="ADAL" clId="{3552CE5B-0803-49BD-A011-F4C75B92F40C}" dt="2018-03-30T07:15:40.962" v="1416" actId="20577"/>
+        <pc:sldMkLst>
+          <pc:docMk/>
+          <pc:sldMk cId="518247939" sldId="277"/>
+        </pc:sldMkLst>
+        <pc:spChg chg="mod">
+          <ac:chgData name=" " userId="f0093c6c-aad3-47c8-981f-e49faae5c851" providerId="ADAL" clId="{3552CE5B-0803-49BD-A011-F4C75B92F40C}" dt="2018-03-30T07:15:40.962" v="1416" actId="20577"/>
+          <ac:spMkLst>
+            <pc:docMk/>
+            <pc:sldMk cId="518247939" sldId="277"/>
+            <ac:spMk id="2" creationId="{B07C778A-F5E1-4402-815A-96BEA14E6883}"/>
           </ac:spMkLst>
         </pc:spChg>
       </pc:sldChg>
@@ -560,477 +385,6 @@
       <pc:docMkLst>
         <pc:docMk/>
       </pc:docMkLst>
-      <pc:sldChg chg="addSp delSp modSp">
-        <pc:chgData name="Eugene CHOY Wen Jia" userId="f0093c6c-aad3-47c8-981f-e49faae5c851" providerId="ADAL" clId="{3552CE5B-0803-49BD-A011-F4C75B92F40C}" dt="2018-03-20T07:13:31.677" v="321" actId="1076"/>
-        <pc:sldMkLst>
-          <pc:docMk/>
-          <pc:sldMk cId="576619051" sldId="257"/>
-        </pc:sldMkLst>
-        <pc:spChg chg="mod">
-          <ac:chgData name="Eugene CHOY Wen Jia" userId="f0093c6c-aad3-47c8-981f-e49faae5c851" providerId="ADAL" clId="{3552CE5B-0803-49BD-A011-F4C75B92F40C}" dt="2018-03-20T07:12:59.050" v="316" actId="20577"/>
-          <ac:spMkLst>
-            <pc:docMk/>
-            <pc:sldMk cId="576619051" sldId="257"/>
-            <ac:spMk id="4" creationId="{B7FE81CF-4DDC-4B5E-8304-6A1BFD48C76B}"/>
-          </ac:spMkLst>
-        </pc:spChg>
-        <pc:spChg chg="mod topLvl">
-          <ac:chgData name="Eugene CHOY Wen Jia" userId="f0093c6c-aad3-47c8-981f-e49faae5c851" providerId="ADAL" clId="{3552CE5B-0803-49BD-A011-F4C75B92F40C}" dt="2018-03-20T06:57:27.080" v="95" actId="404"/>
-          <ac:spMkLst>
-            <pc:docMk/>
-            <pc:sldMk cId="576619051" sldId="257"/>
-            <ac:spMk id="7" creationId="{1F77A314-7F07-43ED-9FB3-650E3013A58B}"/>
-          </ac:spMkLst>
-        </pc:spChg>
-        <pc:spChg chg="mod">
-          <ac:chgData name="Eugene CHOY Wen Jia" userId="f0093c6c-aad3-47c8-981f-e49faae5c851" providerId="ADAL" clId="{3552CE5B-0803-49BD-A011-F4C75B92F40C}" dt="2018-03-20T07:00:48.997" v="153" actId="1076"/>
-          <ac:spMkLst>
-            <pc:docMk/>
-            <pc:sldMk cId="576619051" sldId="257"/>
-            <ac:spMk id="10" creationId="{9800C6B1-C350-4C6A-92E3-AAD83D06D33A}"/>
-          </ac:spMkLst>
-        </pc:spChg>
-        <pc:spChg chg="add del">
-          <ac:chgData name="Eugene CHOY Wen Jia" userId="f0093c6c-aad3-47c8-981f-e49faae5c851" providerId="ADAL" clId="{3552CE5B-0803-49BD-A011-F4C75B92F40C}" dt="2018-03-20T06:56:16.917" v="86" actId="478"/>
-          <ac:spMkLst>
-            <pc:docMk/>
-            <pc:sldMk cId="576619051" sldId="257"/>
-            <ac:spMk id="13" creationId="{7F03AE14-00C5-48A3-A3FD-38F601FC4616}"/>
-          </ac:spMkLst>
-        </pc:spChg>
-        <pc:spChg chg="mod">
-          <ac:chgData name="Eugene CHOY Wen Jia" userId="f0093c6c-aad3-47c8-981f-e49faae5c851" providerId="ADAL" clId="{3552CE5B-0803-49BD-A011-F4C75B92F40C}" dt="2018-03-20T07:01:20.141" v="160" actId="1076"/>
-          <ac:spMkLst>
-            <pc:docMk/>
-            <pc:sldMk cId="576619051" sldId="257"/>
-            <ac:spMk id="23" creationId="{CBD54833-AD6B-4E26-BD20-A0B9FCE70EDA}"/>
-          </ac:spMkLst>
-        </pc:spChg>
-        <pc:spChg chg="mod">
-          <ac:chgData name="Eugene CHOY Wen Jia" userId="f0093c6c-aad3-47c8-981f-e49faae5c851" providerId="ADAL" clId="{3552CE5B-0803-49BD-A011-F4C75B92F40C}" dt="2018-03-20T06:58:04.347" v="108" actId="404"/>
-          <ac:spMkLst>
-            <pc:docMk/>
-            <pc:sldMk cId="576619051" sldId="257"/>
-            <ac:spMk id="25" creationId="{EC2323EA-C17D-4014-9F01-C357DA3EA42D}"/>
-          </ac:spMkLst>
-        </pc:spChg>
-        <pc:spChg chg="mod">
-          <ac:chgData name="Eugene CHOY Wen Jia" userId="f0093c6c-aad3-47c8-981f-e49faae5c851" providerId="ADAL" clId="{3552CE5B-0803-49BD-A011-F4C75B92F40C}" dt="2018-03-20T06:59:43.066" v="133" actId="1076"/>
-          <ac:spMkLst>
-            <pc:docMk/>
-            <pc:sldMk cId="576619051" sldId="257"/>
-            <ac:spMk id="29" creationId="{882E8340-A17A-416C-B177-62F27DC00613}"/>
-          </ac:spMkLst>
-        </pc:spChg>
-        <pc:spChg chg="mod">
-          <ac:chgData name="Eugene CHOY Wen Jia" userId="f0093c6c-aad3-47c8-981f-e49faae5c851" providerId="ADAL" clId="{3552CE5B-0803-49BD-A011-F4C75B92F40C}" dt="2018-03-20T07:03:20.259" v="211" actId="1076"/>
-          <ac:spMkLst>
-            <pc:docMk/>
-            <pc:sldMk cId="576619051" sldId="257"/>
-            <ac:spMk id="42" creationId="{5EFE54E3-B97B-46C7-92AF-B57445685AEF}"/>
-          </ac:spMkLst>
-        </pc:spChg>
-        <pc:spChg chg="mod">
-          <ac:chgData name="Eugene CHOY Wen Jia" userId="f0093c6c-aad3-47c8-981f-e49faae5c851" providerId="ADAL" clId="{3552CE5B-0803-49BD-A011-F4C75B92F40C}" dt="2018-03-20T07:13:31.677" v="321" actId="1076"/>
-          <ac:spMkLst>
-            <pc:docMk/>
-            <pc:sldMk cId="576619051" sldId="257"/>
-            <ac:spMk id="51" creationId="{F1069B8D-71A9-4E35-A146-1936AECD6276}"/>
-          </ac:spMkLst>
-        </pc:spChg>
-        <pc:spChg chg="mod">
-          <ac:chgData name="Eugene CHOY Wen Jia" userId="f0093c6c-aad3-47c8-981f-e49faae5c851" providerId="ADAL" clId="{3552CE5B-0803-49BD-A011-F4C75B92F40C}" dt="2018-03-20T07:01:25.125" v="161" actId="404"/>
-          <ac:spMkLst>
-            <pc:docMk/>
-            <pc:sldMk cId="576619051" sldId="257"/>
-            <ac:spMk id="58" creationId="{D2D6274C-B8EC-49A7-92EF-BF33EE663F29}"/>
-          </ac:spMkLst>
-        </pc:spChg>
-        <pc:spChg chg="mod">
-          <ac:chgData name="Eugene CHOY Wen Jia" userId="f0093c6c-aad3-47c8-981f-e49faae5c851" providerId="ADAL" clId="{3552CE5B-0803-49BD-A011-F4C75B92F40C}" dt="2018-03-20T07:09:42.037" v="300" actId="1076"/>
-          <ac:spMkLst>
-            <pc:docMk/>
-            <pc:sldMk cId="576619051" sldId="257"/>
-            <ac:spMk id="63" creationId="{6C2417B4-8A3B-459B-90E3-E45536848137}"/>
-          </ac:spMkLst>
-        </pc:spChg>
-        <pc:spChg chg="mod">
-          <ac:chgData name="Eugene CHOY Wen Jia" userId="f0093c6c-aad3-47c8-981f-e49faae5c851" providerId="ADAL" clId="{3552CE5B-0803-49BD-A011-F4C75B92F40C}" dt="2018-03-20T07:06:36.435" v="254" actId="404"/>
-          <ac:spMkLst>
-            <pc:docMk/>
-            <pc:sldMk cId="576619051" sldId="257"/>
-            <ac:spMk id="65" creationId="{8B3E46FF-3599-4502-857A-A9F7DAD6DB2D}"/>
-          </ac:spMkLst>
-        </pc:spChg>
-        <pc:spChg chg="mod">
-          <ac:chgData name="Eugene CHOY Wen Jia" userId="f0093c6c-aad3-47c8-981f-e49faae5c851" providerId="ADAL" clId="{3552CE5B-0803-49BD-A011-F4C75B92F40C}" dt="2018-03-20T07:01:54.815" v="169" actId="404"/>
-          <ac:spMkLst>
-            <pc:docMk/>
-            <pc:sldMk cId="576619051" sldId="257"/>
-            <ac:spMk id="69" creationId="{87FD0C4E-3A59-4EA3-99BD-D7E601D7FAAA}"/>
-          </ac:spMkLst>
-        </pc:spChg>
-        <pc:spChg chg="mod">
-          <ac:chgData name="Eugene CHOY Wen Jia" userId="f0093c6c-aad3-47c8-981f-e49faae5c851" providerId="ADAL" clId="{3552CE5B-0803-49BD-A011-F4C75B92F40C}" dt="2018-03-20T07:07:24.719" v="272" actId="1076"/>
-          <ac:spMkLst>
-            <pc:docMk/>
-            <pc:sldMk cId="576619051" sldId="257"/>
-            <ac:spMk id="72" creationId="{A07C89D9-E262-4A8A-9272-889371116074}"/>
-          </ac:spMkLst>
-        </pc:spChg>
-        <pc:spChg chg="mod">
-          <ac:chgData name="Eugene CHOY Wen Jia" userId="f0093c6c-aad3-47c8-981f-e49faae5c851" providerId="ADAL" clId="{3552CE5B-0803-49BD-A011-F4C75B92F40C}" dt="2018-03-20T07:09:50.590" v="303" actId="1076"/>
-          <ac:spMkLst>
-            <pc:docMk/>
-            <pc:sldMk cId="576619051" sldId="257"/>
-            <ac:spMk id="77" creationId="{F218D09A-16CE-4C90-8245-440D8FA85A8E}"/>
-          </ac:spMkLst>
-        </pc:spChg>
-        <pc:spChg chg="mod">
-          <ac:chgData name="Eugene CHOY Wen Jia" userId="f0093c6c-aad3-47c8-981f-e49faae5c851" providerId="ADAL" clId="{3552CE5B-0803-49BD-A011-F4C75B92F40C}" dt="2018-03-20T07:02:15.879" v="195" actId="20577"/>
-          <ac:spMkLst>
-            <pc:docMk/>
-            <pc:sldMk cId="576619051" sldId="257"/>
-            <ac:spMk id="79" creationId="{505DFB36-8D90-4C62-A2DA-6218BDB3816F}"/>
-          </ac:spMkLst>
-        </pc:spChg>
-        <pc:spChg chg="mod">
-          <ac:chgData name="Eugene CHOY Wen Jia" userId="f0093c6c-aad3-47c8-981f-e49faae5c851" providerId="ADAL" clId="{3552CE5B-0803-49BD-A011-F4C75B92F40C}" dt="2018-03-20T07:10:15.782" v="308" actId="1076"/>
-          <ac:spMkLst>
-            <pc:docMk/>
-            <pc:sldMk cId="576619051" sldId="257"/>
-            <ac:spMk id="92" creationId="{F801533A-EAA5-4273-A826-CB85FF3C711E}"/>
-          </ac:spMkLst>
-        </pc:spChg>
-        <pc:spChg chg="mod">
-          <ac:chgData name="Eugene CHOY Wen Jia" userId="f0093c6c-aad3-47c8-981f-e49faae5c851" providerId="ADAL" clId="{3552CE5B-0803-49BD-A011-F4C75B92F40C}" dt="2018-03-20T07:00:21.731" v="146" actId="1076"/>
-          <ac:spMkLst>
-            <pc:docMk/>
-            <pc:sldMk cId="576619051" sldId="257"/>
-            <ac:spMk id="121" creationId="{E5945A79-C75F-4F8B-8CF5-E1637E1D4AFC}"/>
-          </ac:spMkLst>
-        </pc:spChg>
-        <pc:spChg chg="mod">
-          <ac:chgData name="Eugene CHOY Wen Jia" userId="f0093c6c-aad3-47c8-981f-e49faae5c851" providerId="ADAL" clId="{3552CE5B-0803-49BD-A011-F4C75B92F40C}" dt="2018-03-20T06:59:52.280" v="136" actId="14100"/>
-          <ac:spMkLst>
-            <pc:docMk/>
-            <pc:sldMk cId="576619051" sldId="257"/>
-            <ac:spMk id="135" creationId="{3901C13B-28AB-487B-BDE6-798251662321}"/>
-          </ac:spMkLst>
-        </pc:spChg>
-        <pc:spChg chg="mod">
-          <ac:chgData name="Eugene CHOY Wen Jia" userId="f0093c6c-aad3-47c8-981f-e49faae5c851" providerId="ADAL" clId="{3552CE5B-0803-49BD-A011-F4C75B92F40C}" dt="2018-03-20T07:00:06.688" v="144" actId="1037"/>
-          <ac:spMkLst>
-            <pc:docMk/>
-            <pc:sldMk cId="576619051" sldId="257"/>
-            <ac:spMk id="147" creationId="{57592175-5584-4596-8F43-35BBEA6DCF28}"/>
-          </ac:spMkLst>
-        </pc:spChg>
-        <pc:spChg chg="mod">
-          <ac:chgData name="Eugene CHOY Wen Jia" userId="f0093c6c-aad3-47c8-981f-e49faae5c851" providerId="ADAL" clId="{3552CE5B-0803-49BD-A011-F4C75B92F40C}" dt="2018-03-20T07:08:34.025" v="288" actId="404"/>
-          <ac:spMkLst>
-            <pc:docMk/>
-            <pc:sldMk cId="576619051" sldId="257"/>
-            <ac:spMk id="149" creationId="{0253AB35-29F0-465C-B472-8980F74A41D8}"/>
-          </ac:spMkLst>
-        </pc:spChg>
-        <pc:spChg chg="mod">
-          <ac:chgData name="Eugene CHOY Wen Jia" userId="f0093c6c-aad3-47c8-981f-e49faae5c851" providerId="ADAL" clId="{3552CE5B-0803-49BD-A011-F4C75B92F40C}" dt="2018-03-20T07:01:03.891" v="156" actId="1076"/>
-          <ac:spMkLst>
-            <pc:docMk/>
-            <pc:sldMk cId="576619051" sldId="257"/>
-            <ac:spMk id="178" creationId="{A9EA4FF5-80BF-4869-8E68-0C744456C5C5}"/>
-          </ac:spMkLst>
-        </pc:spChg>
-        <pc:spChg chg="mod">
-          <ac:chgData name="Eugene CHOY Wen Jia" userId="f0093c6c-aad3-47c8-981f-e49faae5c851" providerId="ADAL" clId="{3552CE5B-0803-49BD-A011-F4C75B92F40C}" dt="2018-03-20T07:13:23.414" v="319" actId="1076"/>
-          <ac:spMkLst>
-            <pc:docMk/>
-            <pc:sldMk cId="576619051" sldId="257"/>
-            <ac:spMk id="180" creationId="{EF23C709-46B4-4FC1-A6B8-F1DB1BFD08FF}"/>
-          </ac:spMkLst>
-        </pc:spChg>
-        <pc:grpChg chg="del">
-          <ac:chgData name="Eugene CHOY Wen Jia" userId="f0093c6c-aad3-47c8-981f-e49faae5c851" providerId="ADAL" clId="{3552CE5B-0803-49BD-A011-F4C75B92F40C}" dt="2018-03-20T06:57:11.068" v="89" actId="165"/>
-          <ac:grpSpMkLst>
-            <pc:docMk/>
-            <pc:sldMk cId="576619051" sldId="257"/>
-            <ac:grpSpMk id="5" creationId="{F341EEF3-6254-4563-AF2D-D550F762C806}"/>
-          </ac:grpSpMkLst>
-        </pc:grpChg>
-        <pc:grpChg chg="add mod">
-          <ac:chgData name="Eugene CHOY Wen Jia" userId="f0093c6c-aad3-47c8-981f-e49faae5c851" providerId="ADAL" clId="{3552CE5B-0803-49BD-A011-F4C75B92F40C}" dt="2018-03-20T06:57:20.072" v="93" actId="164"/>
-          <ac:grpSpMkLst>
-            <pc:docMk/>
-            <pc:sldMk cId="576619051" sldId="257"/>
-            <ac:grpSpMk id="17" creationId="{8808C0F9-46C2-40F8-9F98-076B86331510}"/>
-          </ac:grpSpMkLst>
-        </pc:grpChg>
-        <pc:grpChg chg="add mod">
-          <ac:chgData name="Eugene CHOY Wen Jia" userId="f0093c6c-aad3-47c8-981f-e49faae5c851" providerId="ADAL" clId="{3552CE5B-0803-49BD-A011-F4C75B92F40C}" dt="2018-03-20T06:57:31.778" v="97" actId="14100"/>
-          <ac:grpSpMkLst>
-            <pc:docMk/>
-            <pc:sldMk cId="576619051" sldId="257"/>
-            <ac:grpSpMk id="19" creationId="{0178F462-CA38-4F38-9809-B45A2C3C17C6}"/>
-          </ac:grpSpMkLst>
-        </pc:grpChg>
-        <pc:grpChg chg="mod">
-          <ac:chgData name="Eugene CHOY Wen Jia" userId="f0093c6c-aad3-47c8-981f-e49faae5c851" providerId="ADAL" clId="{3552CE5B-0803-49BD-A011-F4C75B92F40C}" dt="2018-03-20T07:09:38.128" v="299" actId="1076"/>
-          <ac:grpSpMkLst>
-            <pc:docMk/>
-            <pc:sldMk cId="576619051" sldId="257"/>
-            <ac:grpSpMk id="56" creationId="{7976C5A8-5D8B-4FD0-93EF-0F0696FB09CF}"/>
-          </ac:grpSpMkLst>
-        </pc:grpChg>
-        <pc:grpChg chg="mod">
-          <ac:chgData name="Eugene CHOY Wen Jia" userId="f0093c6c-aad3-47c8-981f-e49faae5c851" providerId="ADAL" clId="{3552CE5B-0803-49BD-A011-F4C75B92F40C}" dt="2018-03-20T07:09:59.824" v="305" actId="164"/>
-          <ac:grpSpMkLst>
-            <pc:docMk/>
-            <pc:sldMk cId="576619051" sldId="257"/>
-            <ac:grpSpMk id="64" creationId="{2267A04F-96F7-49C0-B8A3-5DC1B3F707BB}"/>
-          </ac:grpSpMkLst>
-        </pc:grpChg>
-        <pc:grpChg chg="add mod">
-          <ac:chgData name="Eugene CHOY Wen Jia" userId="f0093c6c-aad3-47c8-981f-e49faae5c851" providerId="ADAL" clId="{3552CE5B-0803-49BD-A011-F4C75B92F40C}" dt="2018-03-20T07:09:45.416" v="301" actId="1076"/>
-          <ac:grpSpMkLst>
-            <pc:docMk/>
-            <pc:sldMk cId="576619051" sldId="257"/>
-            <ac:grpSpMk id="68" creationId="{2ED2848E-3EEE-4C32-AAB3-285C6C487E43}"/>
-          </ac:grpSpMkLst>
-        </pc:grpChg>
-        <pc:grpChg chg="mod">
-          <ac:chgData name="Eugene CHOY Wen Jia" userId="f0093c6c-aad3-47c8-981f-e49faae5c851" providerId="ADAL" clId="{3552CE5B-0803-49BD-A011-F4C75B92F40C}" dt="2018-03-20T07:06:27.175" v="251" actId="164"/>
-          <ac:grpSpMkLst>
-            <pc:docMk/>
-            <pc:sldMk cId="576619051" sldId="257"/>
-            <ac:grpSpMk id="71" creationId="{3FC55428-A528-4B9F-8C06-57C2E45E2767}"/>
-          </ac:grpSpMkLst>
-        </pc:grpChg>
-        <pc:grpChg chg="mod">
-          <ac:chgData name="Eugene CHOY Wen Jia" userId="f0093c6c-aad3-47c8-981f-e49faae5c851" providerId="ADAL" clId="{3552CE5B-0803-49BD-A011-F4C75B92F40C}" dt="2018-03-20T05:32:20.770" v="36" actId="1076"/>
-          <ac:grpSpMkLst>
-            <pc:docMk/>
-            <pc:sldMk cId="576619051" sldId="257"/>
-            <ac:grpSpMk id="78" creationId="{DBACCDC6-70DD-443D-8934-BCEC8CB9F97B}"/>
-          </ac:grpSpMkLst>
-        </pc:grpChg>
-        <pc:grpChg chg="add mod">
-          <ac:chgData name="Eugene CHOY Wen Jia" userId="f0093c6c-aad3-47c8-981f-e49faae5c851" providerId="ADAL" clId="{3552CE5B-0803-49BD-A011-F4C75B92F40C}" dt="2018-03-20T07:10:03.936" v="306" actId="1076"/>
-          <ac:grpSpMkLst>
-            <pc:docMk/>
-            <pc:sldMk cId="576619051" sldId="257"/>
-            <ac:grpSpMk id="88" creationId="{EF65BAA1-BAB8-4F7B-BA7D-9EE30D8D0E2D}"/>
-          </ac:grpSpMkLst>
-        </pc:grpChg>
-        <pc:grpChg chg="mod">
-          <ac:chgData name="Eugene CHOY Wen Jia" userId="f0093c6c-aad3-47c8-981f-e49faae5c851" providerId="ADAL" clId="{3552CE5B-0803-49BD-A011-F4C75B92F40C}" dt="2018-03-20T06:58:32.846" v="113" actId="1076"/>
-          <ac:grpSpMkLst>
-            <pc:docMk/>
-            <pc:sldMk cId="576619051" sldId="257"/>
-            <ac:grpSpMk id="109" creationId="{E53E27CB-D984-4DDA-8490-7CA190442A71}"/>
-          </ac:grpSpMkLst>
-        </pc:grpChg>
-        <pc:grpChg chg="mod">
-          <ac:chgData name="Eugene CHOY Wen Jia" userId="f0093c6c-aad3-47c8-981f-e49faae5c851" providerId="ADAL" clId="{3552CE5B-0803-49BD-A011-F4C75B92F40C}" dt="2018-03-20T07:03:04.601" v="206" actId="1076"/>
-          <ac:grpSpMkLst>
-            <pc:docMk/>
-            <pc:sldMk cId="576619051" sldId="257"/>
-            <ac:grpSpMk id="126" creationId="{BA06E3DD-A2B7-49C6-84FA-B1068E51BEAC}"/>
-          </ac:grpSpMkLst>
-        </pc:grpChg>
-        <pc:grpChg chg="mod">
-          <ac:chgData name="Eugene CHOY Wen Jia" userId="f0093c6c-aad3-47c8-981f-e49faae5c851" providerId="ADAL" clId="{3552CE5B-0803-49BD-A011-F4C75B92F40C}" dt="2018-03-20T06:59:47.846" v="135" actId="1076"/>
-          <ac:grpSpMkLst>
-            <pc:docMk/>
-            <pc:sldMk cId="576619051" sldId="257"/>
-            <ac:grpSpMk id="167" creationId="{7D01A9FB-DC69-4F3F-8728-49CD073C50C3}"/>
-          </ac:grpSpMkLst>
-        </pc:grpChg>
-        <pc:picChg chg="add del">
-          <ac:chgData name="Eugene CHOY Wen Jia" userId="f0093c6c-aad3-47c8-981f-e49faae5c851" providerId="ADAL" clId="{3552CE5B-0803-49BD-A011-F4C75B92F40C}" dt="2018-03-20T05:33:42.943" v="53" actId="1076"/>
-          <ac:picMkLst>
-            <pc:docMk/>
-            <pc:sldMk cId="576619051" sldId="257"/>
-            <ac:picMk id="2" creationId="{E696F1B7-6AA0-45DC-B4C4-5BF95C95C0F8}"/>
-          </ac:picMkLst>
-        </pc:picChg>
-        <pc:picChg chg="mod topLvl">
-          <ac:chgData name="Eugene CHOY Wen Jia" userId="f0093c6c-aad3-47c8-981f-e49faae5c851" providerId="ADAL" clId="{3552CE5B-0803-49BD-A011-F4C75B92F40C}" dt="2018-03-20T06:57:13.595" v="90" actId="164"/>
-          <ac:picMkLst>
-            <pc:docMk/>
-            <pc:sldMk cId="576619051" sldId="257"/>
-            <ac:picMk id="6" creationId="{6853ACC9-E91F-474F-A9EB-35A697F18027}"/>
-          </ac:picMkLst>
-        </pc:picChg>
-        <pc:picChg chg="add del mod">
-          <ac:chgData name="Eugene CHOY Wen Jia" userId="f0093c6c-aad3-47c8-981f-e49faae5c851" providerId="ADAL" clId="{3552CE5B-0803-49BD-A011-F4C75B92F40C}" dt="2018-03-20T05:35:16.127" v="55" actId="478"/>
-          <ac:picMkLst>
-            <pc:docMk/>
-            <pc:sldMk cId="576619051" sldId="257"/>
-            <ac:picMk id="8" creationId="{D639B0EE-9C95-463E-83EE-4C86C8166CB8}"/>
-          </ac:picMkLst>
-        </pc:picChg>
-        <pc:picChg chg="add del mod">
-          <ac:chgData name="Eugene CHOY Wen Jia" userId="f0093c6c-aad3-47c8-981f-e49faae5c851" providerId="ADAL" clId="{3552CE5B-0803-49BD-A011-F4C75B92F40C}" dt="2018-03-20T06:55:06.040" v="61" actId="478"/>
-          <ac:picMkLst>
-            <pc:docMk/>
-            <pc:sldMk cId="576619051" sldId="257"/>
-            <ac:picMk id="12" creationId="{0C75F74A-C53E-4119-BF0B-438A2BFCA58C}"/>
-          </ac:picMkLst>
-        </pc:picChg>
-        <pc:picChg chg="add mod">
-          <ac:chgData name="Eugene CHOY Wen Jia" userId="f0093c6c-aad3-47c8-981f-e49faae5c851" providerId="ADAL" clId="{3552CE5B-0803-49BD-A011-F4C75B92F40C}" dt="2018-03-20T06:57:13.595" v="90" actId="164"/>
-          <ac:picMkLst>
-            <pc:docMk/>
-            <pc:sldMk cId="576619051" sldId="257"/>
-            <ac:picMk id="15" creationId="{E7CC8C3B-F989-4E63-AD36-1A2FF00F5FC6}"/>
-          </ac:picMkLst>
-        </pc:picChg>
-        <pc:picChg chg="add mod">
-          <ac:chgData name="Eugene CHOY Wen Jia" userId="f0093c6c-aad3-47c8-981f-e49faae5c851" providerId="ADAL" clId="{3552CE5B-0803-49BD-A011-F4C75B92F40C}" dt="2018-03-20T07:02:49.037" v="199" actId="1076"/>
-          <ac:picMkLst>
-            <pc:docMk/>
-            <pc:sldMk cId="576619051" sldId="257"/>
-            <ac:picMk id="40" creationId="{03FCBB63-BDD0-446C-B047-E83EFCDC97A8}"/>
-          </ac:picMkLst>
-        </pc:picChg>
-        <pc:picChg chg="add mod">
-          <ac:chgData name="Eugene CHOY Wen Jia" userId="f0093c6c-aad3-47c8-981f-e49faae5c851" providerId="ADAL" clId="{3552CE5B-0803-49BD-A011-F4C75B92F40C}" dt="2018-03-20T07:04:12.992" v="216" actId="1076"/>
-          <ac:picMkLst>
-            <pc:docMk/>
-            <pc:sldMk cId="576619051" sldId="257"/>
-            <ac:picMk id="48" creationId="{566D78A6-50D9-4728-AAB1-95A89AC335C5}"/>
-          </ac:picMkLst>
-        </pc:picChg>
-        <pc:picChg chg="add mod">
-          <ac:chgData name="Eugene CHOY Wen Jia" userId="f0093c6c-aad3-47c8-981f-e49faae5c851" providerId="ADAL" clId="{3552CE5B-0803-49BD-A011-F4C75B92F40C}" dt="2018-03-20T07:05:19.035" v="234" actId="1076"/>
-          <ac:picMkLst>
-            <pc:docMk/>
-            <pc:sldMk cId="576619051" sldId="257"/>
-            <ac:picMk id="52" creationId="{8F8FF822-BDE7-413D-B733-84070E8C3D28}"/>
-          </ac:picMkLst>
-        </pc:picChg>
-        <pc:picChg chg="mod">
-          <ac:chgData name="Eugene CHOY Wen Jia" userId="f0093c6c-aad3-47c8-981f-e49faae5c851" providerId="ADAL" clId="{3552CE5B-0803-49BD-A011-F4C75B92F40C}" dt="2018-03-20T07:01:33.800" v="165" actId="1076"/>
-          <ac:picMkLst>
-            <pc:docMk/>
-            <pc:sldMk cId="576619051" sldId="257"/>
-            <ac:picMk id="57" creationId="{B490D1D9-8703-44A1-B47A-9132FBD36A85}"/>
-          </ac:picMkLst>
-        </pc:picChg>
-        <pc:picChg chg="mod">
-          <ac:chgData name="Eugene CHOY Wen Jia" userId="f0093c6c-aad3-47c8-981f-e49faae5c851" providerId="ADAL" clId="{3552CE5B-0803-49BD-A011-F4C75B92F40C}" dt="2018-03-20T07:05:46.160" v="243" actId="1076"/>
-          <ac:picMkLst>
-            <pc:docMk/>
-            <pc:sldMk cId="576619051" sldId="257"/>
-            <ac:picMk id="66" creationId="{7AFFB57A-AA42-4242-B9BC-4BA274D128DA}"/>
-          </ac:picMkLst>
-        </pc:picChg>
-        <pc:picChg chg="mod">
-          <ac:chgData name="Eugene CHOY Wen Jia" userId="f0093c6c-aad3-47c8-981f-e49faae5c851" providerId="ADAL" clId="{3552CE5B-0803-49BD-A011-F4C75B92F40C}" dt="2018-03-20T07:07:21.774" v="271" actId="1076"/>
-          <ac:picMkLst>
-            <pc:docMk/>
-            <pc:sldMk cId="576619051" sldId="257"/>
-            <ac:picMk id="73" creationId="{FBF02C0D-873E-4CC8-B378-A2129CEFF338}"/>
-          </ac:picMkLst>
-        </pc:picChg>
-        <pc:picChg chg="add mod">
-          <ac:chgData name="Eugene CHOY Wen Jia" userId="f0093c6c-aad3-47c8-981f-e49faae5c851" providerId="ADAL" clId="{3552CE5B-0803-49BD-A011-F4C75B92F40C}" dt="2018-03-20T07:09:59.824" v="305" actId="164"/>
-          <ac:picMkLst>
-            <pc:docMk/>
-            <pc:sldMk cId="576619051" sldId="257"/>
-            <ac:picMk id="76" creationId="{4E2D3EAB-DE34-446D-A72E-0E3C56587257}"/>
-          </ac:picMkLst>
-        </pc:picChg>
-        <pc:picChg chg="add mod">
-          <ac:chgData name="Eugene CHOY Wen Jia" userId="f0093c6c-aad3-47c8-981f-e49faae5c851" providerId="ADAL" clId="{3552CE5B-0803-49BD-A011-F4C75B92F40C}" dt="2018-03-20T07:12:16.509" v="313" actId="1076"/>
-          <ac:picMkLst>
-            <pc:docMk/>
-            <pc:sldMk cId="576619051" sldId="257"/>
-            <ac:picMk id="94" creationId="{E0D478CB-B89A-4C86-BF92-6CA3E15B285B}"/>
-          </ac:picMkLst>
-        </pc:picChg>
-        <pc:picChg chg="add mod">
-          <ac:chgData name="Eugene CHOY Wen Jia" userId="f0093c6c-aad3-47c8-981f-e49faae5c851" providerId="ADAL" clId="{3552CE5B-0803-49BD-A011-F4C75B92F40C}" dt="2018-03-20T06:59:58.737" v="138" actId="1076"/>
-          <ac:picMkLst>
-            <pc:docMk/>
-            <pc:sldMk cId="576619051" sldId="257"/>
-            <ac:picMk id="96" creationId="{B83AE1BB-DE3B-494A-A3F9-7DC9099A6F3A}"/>
-          </ac:picMkLst>
-        </pc:picChg>
-        <pc:picChg chg="add mod">
-          <ac:chgData name="Eugene CHOY Wen Jia" userId="f0093c6c-aad3-47c8-981f-e49faae5c851" providerId="ADAL" clId="{3552CE5B-0803-49BD-A011-F4C75B92F40C}" dt="2018-03-20T07:06:50.619" v="259" actId="1076"/>
-          <ac:picMkLst>
-            <pc:docMk/>
-            <pc:sldMk cId="576619051" sldId="257"/>
-            <ac:picMk id="102" creationId="{066242CB-1568-4176-8CE5-C8B4FC01846D}"/>
-          </ac:picMkLst>
-        </pc:picChg>
-        <pc:picChg chg="mod">
-          <ac:chgData name="Eugene CHOY Wen Jia" userId="f0093c6c-aad3-47c8-981f-e49faae5c851" providerId="ADAL" clId="{3552CE5B-0803-49BD-A011-F4C75B92F40C}" dt="2018-03-20T07:01:05.639" v="157" actId="1076"/>
-          <ac:picMkLst>
-            <pc:docMk/>
-            <pc:sldMk cId="576619051" sldId="257"/>
-            <ac:picMk id="177" creationId="{62589CED-89D1-4477-9144-E7EFBBC41553}"/>
-          </ac:picMkLst>
-        </pc:picChg>
-        <pc:cxnChg chg="mod">
-          <ac:chgData name="Eugene CHOY Wen Jia" userId="f0093c6c-aad3-47c8-981f-e49faae5c851" providerId="ADAL" clId="{3552CE5B-0803-49BD-A011-F4C75B92F40C}" dt="2018-03-20T06:57:46.211" v="103" actId="14100"/>
-          <ac:cxnSpMkLst>
-            <pc:docMk/>
-            <pc:sldMk cId="576619051" sldId="257"/>
-            <ac:cxnSpMk id="18" creationId="{3B890781-4519-431C-8FC6-623DA76406AA}"/>
-          </ac:cxnSpMkLst>
-        </pc:cxnChg>
-        <pc:cxnChg chg="mod">
-          <ac:chgData name="Eugene CHOY Wen Jia" userId="f0093c6c-aad3-47c8-981f-e49faae5c851" providerId="ADAL" clId="{3552CE5B-0803-49BD-A011-F4C75B92F40C}" dt="2018-03-20T07:03:04.601" v="206" actId="1076"/>
-          <ac:cxnSpMkLst>
-            <pc:docMk/>
-            <pc:sldMk cId="576619051" sldId="257"/>
-            <ac:cxnSpMk id="49" creationId="{10503AB8-2E7F-4A4A-8AF9-5A46BDFC0E68}"/>
-          </ac:cxnSpMkLst>
-        </pc:cxnChg>
-        <pc:cxnChg chg="mod">
-          <ac:chgData name="Eugene CHOY Wen Jia" userId="f0093c6c-aad3-47c8-981f-e49faae5c851" providerId="ADAL" clId="{3552CE5B-0803-49BD-A011-F4C75B92F40C}" dt="2018-03-20T07:09:38.128" v="299" actId="1076"/>
-          <ac:cxnSpMkLst>
-            <pc:docMk/>
-            <pc:sldMk cId="576619051" sldId="257"/>
-            <ac:cxnSpMk id="62" creationId="{BC547505-418E-4046-8B9C-3E0502ED48FF}"/>
-          </ac:cxnSpMkLst>
-        </pc:cxnChg>
-        <pc:cxnChg chg="mod">
-          <ac:chgData name="Eugene CHOY Wen Jia" userId="f0093c6c-aad3-47c8-981f-e49faae5c851" providerId="ADAL" clId="{3552CE5B-0803-49BD-A011-F4C75B92F40C}" dt="2018-03-20T07:09:53.620" v="304" actId="14100"/>
-          <ac:cxnSpMkLst>
-            <pc:docMk/>
-            <pc:sldMk cId="576619051" sldId="257"/>
-            <ac:cxnSpMk id="87" creationId="{648BE510-1903-48E0-933F-79AAA6F27823}"/>
-          </ac:cxnSpMkLst>
-        </pc:cxnChg>
-        <pc:cxnChg chg="mod">
-          <ac:chgData name="Eugene CHOY Wen Jia" userId="f0093c6c-aad3-47c8-981f-e49faae5c851" providerId="ADAL" clId="{3552CE5B-0803-49BD-A011-F4C75B92F40C}" dt="2018-03-20T07:10:12.388" v="307" actId="14100"/>
-          <ac:cxnSpMkLst>
-            <pc:docMk/>
-            <pc:sldMk cId="576619051" sldId="257"/>
-            <ac:cxnSpMk id="89" creationId="{48D3BA84-8653-435F-A70F-350C0BDD17B6}"/>
-          </ac:cxnSpMkLst>
-        </pc:cxnChg>
-        <pc:cxnChg chg="mod">
-          <ac:chgData name="Eugene CHOY Wen Jia" userId="f0093c6c-aad3-47c8-981f-e49faae5c851" providerId="ADAL" clId="{3552CE5B-0803-49BD-A011-F4C75B92F40C}" dt="2018-03-20T06:56:27.394" v="87" actId="14100"/>
-          <ac:cxnSpMkLst>
-            <pc:docMk/>
-            <pc:sldMk cId="576619051" sldId="257"/>
-            <ac:cxnSpMk id="91" creationId="{B95C97DD-90C8-4885-AB26-8EB6CEA95AFB}"/>
-          </ac:cxnSpMkLst>
-        </pc:cxnChg>
-        <pc:cxnChg chg="mod">
-          <ac:chgData name="Eugene CHOY Wen Jia" userId="f0093c6c-aad3-47c8-981f-e49faae5c851" providerId="ADAL" clId="{3552CE5B-0803-49BD-A011-F4C75B92F40C}" dt="2018-03-20T06:59:33.003" v="128" actId="14100"/>
-          <ac:cxnSpMkLst>
-            <pc:docMk/>
-            <pc:sldMk cId="576619051" sldId="257"/>
-            <ac:cxnSpMk id="130" creationId="{C4DBE0C7-26A2-40D0-9775-8156C064A289}"/>
-          </ac:cxnSpMkLst>
-        </pc:cxnChg>
-      </pc:sldChg>
     </pc:docChg>
   </pc:docChgLst>
 </pc:chgInfo>
@@ -1938,13 +1292,13 @@
   <p:clrMapOvr>
     <a:masterClrMapping/>
   </p:clrMapOvr>
-  <mc:AlternateContent xmlns:mc="http://schemas.openxmlformats.org/markup-compatibility/2006">
-    <mc:Choice xmlns:p159="http://schemas.microsoft.com/office/powerpoint/2015/09/main" Requires="p159">
+  <mc:AlternateContent xmlns:mc="http://schemas.openxmlformats.org/markup-compatibility/2006" xmlns:p159="http://schemas.microsoft.com/office/powerpoint/2015/09/main">
+    <mc:Choice Requires="p159">
       <p:transition xmlns:p14="http://schemas.microsoft.com/office/powerpoint/2010/main" spd="slow" p14:dur="2000">
         <p159:morph option="byObject"/>
       </p:transition>
     </mc:Choice>
-    <mc:Fallback>
+    <mc:Fallback xmlns="">
       <p:transition spd="slow">
         <p:fade/>
       </p:transition>
@@ -2148,13 +1502,13 @@
   <p:clrMapOvr>
     <a:masterClrMapping/>
   </p:clrMapOvr>
-  <mc:AlternateContent xmlns:mc="http://schemas.openxmlformats.org/markup-compatibility/2006">
-    <mc:Choice xmlns:p159="http://schemas.microsoft.com/office/powerpoint/2015/09/main" Requires="p159">
+  <mc:AlternateContent xmlns:mc="http://schemas.openxmlformats.org/markup-compatibility/2006" xmlns:p159="http://schemas.microsoft.com/office/powerpoint/2015/09/main">
+    <mc:Choice Requires="p159">
       <p:transition xmlns:p14="http://schemas.microsoft.com/office/powerpoint/2010/main" spd="slow" p14:dur="2000">
         <p159:morph option="byObject"/>
       </p:transition>
     </mc:Choice>
-    <mc:Fallback>
+    <mc:Fallback xmlns="">
       <p:transition spd="slow">
         <p:fade/>
       </p:transition>
@@ -2368,13 +1722,13 @@
   <p:clrMapOvr>
     <a:masterClrMapping/>
   </p:clrMapOvr>
-  <mc:AlternateContent xmlns:mc="http://schemas.openxmlformats.org/markup-compatibility/2006">
-    <mc:Choice xmlns:p159="http://schemas.microsoft.com/office/powerpoint/2015/09/main" Requires="p159">
+  <mc:AlternateContent xmlns:mc="http://schemas.openxmlformats.org/markup-compatibility/2006" xmlns:p159="http://schemas.microsoft.com/office/powerpoint/2015/09/main">
+    <mc:Choice Requires="p159">
       <p:transition xmlns:p14="http://schemas.microsoft.com/office/powerpoint/2010/main" spd="slow" p14:dur="2000">
         <p159:morph option="byObject"/>
       </p:transition>
     </mc:Choice>
-    <mc:Fallback>
+    <mc:Fallback xmlns="">
       <p:transition spd="slow">
         <p:fade/>
       </p:transition>
@@ -2578,13 +1932,13 @@
   <p:clrMapOvr>
     <a:masterClrMapping/>
   </p:clrMapOvr>
-  <mc:AlternateContent xmlns:mc="http://schemas.openxmlformats.org/markup-compatibility/2006">
-    <mc:Choice xmlns:p159="http://schemas.microsoft.com/office/powerpoint/2015/09/main" Requires="p159">
+  <mc:AlternateContent xmlns:mc="http://schemas.openxmlformats.org/markup-compatibility/2006" xmlns:p159="http://schemas.microsoft.com/office/powerpoint/2015/09/main">
+    <mc:Choice Requires="p159">
       <p:transition xmlns:p14="http://schemas.microsoft.com/office/powerpoint/2010/main" spd="slow" p14:dur="2000">
         <p159:morph option="byObject"/>
       </p:transition>
     </mc:Choice>
-    <mc:Fallback>
+    <mc:Fallback xmlns="">
       <p:transition spd="slow">
         <p:fade/>
       </p:transition>
@@ -2865,13 +2219,13 @@
   <p:clrMapOvr>
     <a:masterClrMapping/>
   </p:clrMapOvr>
-  <mc:AlternateContent xmlns:mc="http://schemas.openxmlformats.org/markup-compatibility/2006">
-    <mc:Choice xmlns:p159="http://schemas.microsoft.com/office/powerpoint/2015/09/main" Requires="p159">
+  <mc:AlternateContent xmlns:mc="http://schemas.openxmlformats.org/markup-compatibility/2006" xmlns:p159="http://schemas.microsoft.com/office/powerpoint/2015/09/main">
+    <mc:Choice Requires="p159">
       <p:transition xmlns:p14="http://schemas.microsoft.com/office/powerpoint/2010/main" spd="slow" p14:dur="2000">
         <p159:morph option="byObject"/>
       </p:transition>
     </mc:Choice>
-    <mc:Fallback>
+    <mc:Fallback xmlns="">
       <p:transition spd="slow">
         <p:fade/>
       </p:transition>
@@ -3142,13 +2496,13 @@
   <p:clrMapOvr>
     <a:masterClrMapping/>
   </p:clrMapOvr>
-  <mc:AlternateContent xmlns:mc="http://schemas.openxmlformats.org/markup-compatibility/2006">
-    <mc:Choice xmlns:p159="http://schemas.microsoft.com/office/powerpoint/2015/09/main" Requires="p159">
+  <mc:AlternateContent xmlns:mc="http://schemas.openxmlformats.org/markup-compatibility/2006" xmlns:p159="http://schemas.microsoft.com/office/powerpoint/2015/09/main">
+    <mc:Choice Requires="p159">
       <p:transition xmlns:p14="http://schemas.microsoft.com/office/powerpoint/2010/main" spd="slow" p14:dur="2000">
         <p159:morph option="byObject"/>
       </p:transition>
     </mc:Choice>
-    <mc:Fallback>
+    <mc:Fallback xmlns="">
       <p:transition spd="slow">
         <p:fade/>
       </p:transition>
@@ -3566,13 +2920,13 @@
   <p:clrMapOvr>
     <a:masterClrMapping/>
   </p:clrMapOvr>
-  <mc:AlternateContent xmlns:mc="http://schemas.openxmlformats.org/markup-compatibility/2006">
-    <mc:Choice xmlns:p159="http://schemas.microsoft.com/office/powerpoint/2015/09/main" Requires="p159">
+  <mc:AlternateContent xmlns:mc="http://schemas.openxmlformats.org/markup-compatibility/2006" xmlns:p159="http://schemas.microsoft.com/office/powerpoint/2015/09/main">
+    <mc:Choice Requires="p159">
       <p:transition xmlns:p14="http://schemas.microsoft.com/office/powerpoint/2010/main" spd="slow" p14:dur="2000">
         <p159:morph option="byObject"/>
       </p:transition>
     </mc:Choice>
-    <mc:Fallback>
+    <mc:Fallback xmlns="">
       <p:transition spd="slow">
         <p:fade/>
       </p:transition>
@@ -3719,13 +3073,13 @@
   <p:clrMapOvr>
     <a:masterClrMapping/>
   </p:clrMapOvr>
-  <mc:AlternateContent xmlns:mc="http://schemas.openxmlformats.org/markup-compatibility/2006">
-    <mc:Choice xmlns:p159="http://schemas.microsoft.com/office/powerpoint/2015/09/main" Requires="p159">
+  <mc:AlternateContent xmlns:mc="http://schemas.openxmlformats.org/markup-compatibility/2006" xmlns:p159="http://schemas.microsoft.com/office/powerpoint/2015/09/main">
+    <mc:Choice Requires="p159">
       <p:transition xmlns:p14="http://schemas.microsoft.com/office/powerpoint/2010/main" spd="slow" p14:dur="2000">
         <p159:morph option="byObject"/>
       </p:transition>
     </mc:Choice>
-    <mc:Fallback>
+    <mc:Fallback xmlns="">
       <p:transition spd="slow">
         <p:fade/>
       </p:transition>
@@ -3844,13 +3198,13 @@
   <p:clrMapOvr>
     <a:masterClrMapping/>
   </p:clrMapOvr>
-  <mc:AlternateContent xmlns:mc="http://schemas.openxmlformats.org/markup-compatibility/2006">
-    <mc:Choice xmlns:p159="http://schemas.microsoft.com/office/powerpoint/2015/09/main" Requires="p159">
+  <mc:AlternateContent xmlns:mc="http://schemas.openxmlformats.org/markup-compatibility/2006" xmlns:p159="http://schemas.microsoft.com/office/powerpoint/2015/09/main">
+    <mc:Choice Requires="p159">
       <p:transition xmlns:p14="http://schemas.microsoft.com/office/powerpoint/2010/main" spd="slow" p14:dur="2000">
         <p159:morph option="byObject"/>
       </p:transition>
     </mc:Choice>
-    <mc:Fallback>
+    <mc:Fallback xmlns="">
       <p:transition spd="slow">
         <p:fade/>
       </p:transition>
@@ -4167,13 +3521,13 @@
   <p:clrMapOvr>
     <a:masterClrMapping/>
   </p:clrMapOvr>
-  <mc:AlternateContent xmlns:mc="http://schemas.openxmlformats.org/markup-compatibility/2006">
-    <mc:Choice xmlns:p159="http://schemas.microsoft.com/office/powerpoint/2015/09/main" Requires="p159">
+  <mc:AlternateContent xmlns:mc="http://schemas.openxmlformats.org/markup-compatibility/2006" xmlns:p159="http://schemas.microsoft.com/office/powerpoint/2015/09/main">
+    <mc:Choice Requires="p159">
       <p:transition xmlns:p14="http://schemas.microsoft.com/office/powerpoint/2010/main" spd="slow" p14:dur="2000">
         <p159:morph option="byObject"/>
       </p:transition>
     </mc:Choice>
-    <mc:Fallback>
+    <mc:Fallback xmlns="">
       <p:transition spd="slow">
         <p:fade/>
       </p:transition>
@@ -4467,13 +3821,13 @@
   <p:clrMapOvr>
     <a:masterClrMapping/>
   </p:clrMapOvr>
-  <mc:AlternateContent xmlns:mc="http://schemas.openxmlformats.org/markup-compatibility/2006">
-    <mc:Choice xmlns:p159="http://schemas.microsoft.com/office/powerpoint/2015/09/main" Requires="p159">
+  <mc:AlternateContent xmlns:mc="http://schemas.openxmlformats.org/markup-compatibility/2006" xmlns:p159="http://schemas.microsoft.com/office/powerpoint/2015/09/main">
+    <mc:Choice Requires="p159">
       <p:transition xmlns:p14="http://schemas.microsoft.com/office/powerpoint/2010/main" spd="slow" p14:dur="2000">
         <p159:morph option="byObject"/>
       </p:transition>
     </mc:Choice>
-    <mc:Fallback>
+    <mc:Fallback xmlns="">
       <p:transition spd="slow">
         <p:fade/>
       </p:transition>
@@ -4770,13 +4124,13 @@
     <p:sldLayoutId id="2147483682" r:id="rId10"/>
     <p:sldLayoutId id="2147483683" r:id="rId11"/>
   </p:sldLayoutIdLst>
-  <mc:AlternateContent xmlns:mc="http://schemas.openxmlformats.org/markup-compatibility/2006">
-    <mc:Choice xmlns:p159="http://schemas.microsoft.com/office/powerpoint/2015/09/main" Requires="p159">
+  <mc:AlternateContent xmlns:mc="http://schemas.openxmlformats.org/markup-compatibility/2006" xmlns:p159="http://schemas.microsoft.com/office/powerpoint/2015/09/main">
+    <mc:Choice Requires="p159">
       <p:transition xmlns:p14="http://schemas.microsoft.com/office/powerpoint/2010/main" spd="slow" p14:dur="2000">
         <p159:morph option="byObject"/>
       </p:transition>
     </mc:Choice>
-    <mc:Fallback>
+    <mc:Fallback xmlns="">
       <p:transition spd="slow">
         <p:fade/>
       </p:transition>
@@ -5324,13 +4678,13 @@
   <p:clrMapOvr>
     <a:masterClrMapping/>
   </p:clrMapOvr>
-  <mc:AlternateContent xmlns:mc="http://schemas.openxmlformats.org/markup-compatibility/2006">
-    <mc:Choice xmlns:p159="http://schemas.microsoft.com/office/powerpoint/2015/09/main" Requires="p159">
+  <mc:AlternateContent xmlns:mc="http://schemas.openxmlformats.org/markup-compatibility/2006" xmlns:p159="http://schemas.microsoft.com/office/powerpoint/2015/09/main">
+    <mc:Choice Requires="p159">
       <p:transition xmlns:p14="http://schemas.microsoft.com/office/powerpoint/2010/main" spd="slow" p14:dur="2000">
         <p159:morph option="byObject"/>
       </p:transition>
     </mc:Choice>
-    <mc:Fallback>
+    <mc:Fallback xmlns="">
       <p:transition spd="slow">
         <p:fade/>
       </p:transition>
@@ -5435,13 +4789,13 @@
   <p:clrMapOvr>
     <a:masterClrMapping/>
   </p:clrMapOvr>
-  <mc:AlternateContent xmlns:mc="http://schemas.openxmlformats.org/markup-compatibility/2006">
-    <mc:Choice xmlns:p159="http://schemas.microsoft.com/office/powerpoint/2015/09/main" Requires="p159">
+  <mc:AlternateContent xmlns:mc="http://schemas.openxmlformats.org/markup-compatibility/2006" xmlns:p159="http://schemas.microsoft.com/office/powerpoint/2015/09/main">
+    <mc:Choice Requires="p159">
       <p:transition xmlns:p14="http://schemas.microsoft.com/office/powerpoint/2010/main" spd="slow" p14:dur="2000">
         <p159:morph option="byObject"/>
       </p:transition>
     </mc:Choice>
-    <mc:Fallback>
+    <mc:Fallback xmlns="">
       <p:transition spd="slow">
         <p:fade/>
       </p:transition>
@@ -5512,13 +4866,13 @@
   <p:clrMapOvr>
     <a:masterClrMapping/>
   </p:clrMapOvr>
-  <mc:AlternateContent xmlns:mc="http://schemas.openxmlformats.org/markup-compatibility/2006">
-    <mc:Choice xmlns:p159="http://schemas.microsoft.com/office/powerpoint/2015/09/main" Requires="p159">
+  <mc:AlternateContent xmlns:mc="http://schemas.openxmlformats.org/markup-compatibility/2006" xmlns:p159="http://schemas.microsoft.com/office/powerpoint/2015/09/main">
+    <mc:Choice Requires="p159">
       <p:transition xmlns:p14="http://schemas.microsoft.com/office/powerpoint/2010/main" spd="slow" p14:dur="2000">
         <p159:morph option="byObject"/>
       </p:transition>
     </mc:Choice>
-    <mc:Fallback>
+    <mc:Fallback xmlns="">
       <p:transition spd="slow">
         <p:fade/>
       </p:transition>
@@ -7313,13 +6667,13 @@
   <p:clrMapOvr>
     <a:masterClrMapping/>
   </p:clrMapOvr>
-  <mc:AlternateContent xmlns:mc="http://schemas.openxmlformats.org/markup-compatibility/2006">
-    <mc:Choice xmlns:p159="http://schemas.microsoft.com/office/powerpoint/2015/09/main" Requires="p159">
+  <mc:AlternateContent xmlns:mc="http://schemas.openxmlformats.org/markup-compatibility/2006" xmlns:p159="http://schemas.microsoft.com/office/powerpoint/2015/09/main">
+    <mc:Choice Requires="p159">
       <p:transition xmlns:p14="http://schemas.microsoft.com/office/powerpoint/2010/main" spd="slow" p14:dur="2000">
         <p159:morph option="byObject"/>
       </p:transition>
     </mc:Choice>
-    <mc:Fallback>
+    <mc:Fallback xmlns="">
       <p:transition spd="slow">
         <p:fade/>
       </p:transition>
@@ -7424,13 +6778,13 @@
   <p:clrMapOvr>
     <a:masterClrMapping/>
   </p:clrMapOvr>
-  <mc:AlternateContent xmlns:mc="http://schemas.openxmlformats.org/markup-compatibility/2006">
-    <mc:Choice xmlns:p159="http://schemas.microsoft.com/office/powerpoint/2015/09/main" Requires="p159">
+  <mc:AlternateContent xmlns:mc="http://schemas.openxmlformats.org/markup-compatibility/2006" xmlns:p159="http://schemas.microsoft.com/office/powerpoint/2015/09/main">
+    <mc:Choice Requires="p159">
       <p:transition xmlns:p14="http://schemas.microsoft.com/office/powerpoint/2010/main" spd="slow" p14:dur="2000">
         <p159:morph option="byObject"/>
       </p:transition>
     </mc:Choice>
-    <mc:Fallback>
+    <mc:Fallback xmlns="">
       <p:transition spd="slow">
         <p:fade/>
       </p:transition>
@@ -7501,13 +6855,13 @@
   <p:clrMapOvr>
     <a:masterClrMapping/>
   </p:clrMapOvr>
-  <mc:AlternateContent xmlns:mc="http://schemas.openxmlformats.org/markup-compatibility/2006">
-    <mc:Choice xmlns:p159="http://schemas.microsoft.com/office/powerpoint/2015/09/main" Requires="p159">
+  <mc:AlternateContent xmlns:mc="http://schemas.openxmlformats.org/markup-compatibility/2006" xmlns:p159="http://schemas.microsoft.com/office/powerpoint/2015/09/main">
+    <mc:Choice Requires="p159">
       <p:transition xmlns:p14="http://schemas.microsoft.com/office/powerpoint/2010/main" spd="slow" p14:dur="2000">
         <p159:morph option="byObject"/>
       </p:transition>
     </mc:Choice>
-    <mc:Fallback>
+    <mc:Fallback xmlns="">
       <p:transition spd="slow">
         <p:fade/>
       </p:transition>
@@ -9245,13 +8599,13 @@
   <p:clrMapOvr>
     <a:masterClrMapping/>
   </p:clrMapOvr>
-  <mc:AlternateContent xmlns:mc="http://schemas.openxmlformats.org/markup-compatibility/2006">
-    <mc:Choice xmlns:p159="http://schemas.microsoft.com/office/powerpoint/2015/09/main" Requires="p159">
+  <mc:AlternateContent xmlns:mc="http://schemas.openxmlformats.org/markup-compatibility/2006" xmlns:p159="http://schemas.microsoft.com/office/powerpoint/2015/09/main">
+    <mc:Choice Requires="p159">
       <p:transition xmlns:p14="http://schemas.microsoft.com/office/powerpoint/2010/main" spd="slow" p14:dur="2000">
         <p159:morph option="byObject"/>
       </p:transition>
     </mc:Choice>
-    <mc:Fallback>
+    <mc:Fallback xmlns="">
       <p:transition spd="slow">
         <p:fade/>
       </p:transition>
@@ -9279,6 +8633,196 @@
       </p:grpSpPr>
       <p:sp>
         <p:nvSpPr>
+          <p:cNvPr id="4" name="Title 3">
+            <a:extLst>
+              <a:ext uri="{FF2B5EF4-FFF2-40B4-BE49-F238E27FC236}">
+                <a16:creationId xmlns:a16="http://schemas.microsoft.com/office/drawing/2014/main" id="{5A4D4960-C44F-4557-A146-DE7FF1BC4551}"/>
+              </a:ext>
+            </a:extLst>
+          </p:cNvPr>
+          <p:cNvSpPr>
+            <a:spLocks noGrp="1"/>
+          </p:cNvSpPr>
+          <p:nvPr>
+            <p:ph type="title"/>
+          </p:nvPr>
+        </p:nvSpPr>
+        <p:spPr/>
+        <p:txBody>
+          <a:bodyPr/>
+          <a:lstStyle/>
+          <a:p>
+            <a:r>
+              <a:rPr lang="en-US" dirty="0"/>
+              <a:t>Content Routing</a:t>
+            </a:r>
+          </a:p>
+        </p:txBody>
+      </p:sp>
+      <p:sp>
+        <p:nvSpPr>
+          <p:cNvPr id="5" name="Content Placeholder 4">
+            <a:extLst>
+              <a:ext uri="{FF2B5EF4-FFF2-40B4-BE49-F238E27FC236}">
+                <a16:creationId xmlns:a16="http://schemas.microsoft.com/office/drawing/2014/main" id="{612B5993-4415-41FC-BB77-1979082721DC}"/>
+              </a:ext>
+            </a:extLst>
+          </p:cNvPr>
+          <p:cNvSpPr>
+            <a:spLocks noGrp="1"/>
+          </p:cNvSpPr>
+          <p:nvPr>
+            <p:ph idx="1"/>
+          </p:nvPr>
+        </p:nvSpPr>
+        <p:spPr/>
+        <p:txBody>
+          <a:bodyPr/>
+          <a:lstStyle/>
+          <a:p>
+            <a:endParaRPr lang="en-US" dirty="0"/>
+          </a:p>
+        </p:txBody>
+      </p:sp>
+    </p:spTree>
+    <p:extLst>
+      <p:ext uri="{BB962C8B-B14F-4D97-AF65-F5344CB8AC3E}">
+        <p14:creationId xmlns:p14="http://schemas.microsoft.com/office/powerpoint/2010/main" val="1763506197"/>
+      </p:ext>
+    </p:extLst>
+  </p:cSld>
+  <p:clrMapOvr>
+    <a:masterClrMapping/>
+  </p:clrMapOvr>
+  <mc:AlternateContent xmlns:mc="http://schemas.openxmlformats.org/markup-compatibility/2006" xmlns:p159="http://schemas.microsoft.com/office/powerpoint/2015/09/main">
+    <mc:Choice Requires="p159">
+      <p:transition xmlns:p14="http://schemas.microsoft.com/office/powerpoint/2010/main" spd="slow" p14:dur="2000">
+        <p159:morph option="byObject"/>
+      </p:transition>
+    </mc:Choice>
+    <mc:Fallback xmlns="">
+      <p:transition spd="slow">
+        <p:fade/>
+      </p:transition>
+    </mc:Fallback>
+  </mc:AlternateContent>
+</p:sld>
+</file>
+
+<file path=ppt/slides/slide17.xml><?xml version="1.0" encoding="utf-8"?>
+<p:sld xmlns:a="http://schemas.openxmlformats.org/drawingml/2006/main" xmlns:r="http://schemas.openxmlformats.org/officeDocument/2006/relationships" xmlns:p="http://schemas.openxmlformats.org/presentationml/2006/main">
+  <p:cSld>
+    <p:spTree>
+      <p:nvGrpSpPr>
+        <p:cNvPr id="1" name=""/>
+        <p:cNvGrpSpPr/>
+        <p:nvPr/>
+      </p:nvGrpSpPr>
+      <p:grpSpPr>
+        <a:xfrm>
+          <a:off x="0" y="0"/>
+          <a:ext cx="0" cy="0"/>
+          <a:chOff x="0" y="0"/>
+          <a:chExt cx="0" cy="0"/>
+        </a:xfrm>
+      </p:grpSpPr>
+      <p:sp>
+        <p:nvSpPr>
+          <p:cNvPr id="2" name="Title 1">
+            <a:extLst>
+              <a:ext uri="{FF2B5EF4-FFF2-40B4-BE49-F238E27FC236}">
+                <a16:creationId xmlns:a16="http://schemas.microsoft.com/office/drawing/2014/main" id="{B07C778A-F5E1-4402-815A-96BEA14E6883}"/>
+              </a:ext>
+            </a:extLst>
+          </p:cNvPr>
+          <p:cNvSpPr>
+            <a:spLocks noGrp="1"/>
+          </p:cNvSpPr>
+          <p:nvPr>
+            <p:ph type="title"/>
+          </p:nvPr>
+        </p:nvSpPr>
+        <p:spPr/>
+        <p:txBody>
+          <a:bodyPr/>
+          <a:lstStyle/>
+          <a:p>
+            <a:r>
+              <a:rPr lang="en-US" dirty="0"/>
+              <a:t>Data Transformation</a:t>
+            </a:r>
+          </a:p>
+        </p:txBody>
+      </p:sp>
+      <p:sp>
+        <p:nvSpPr>
+          <p:cNvPr id="3" name="Content Placeholder 2">
+            <a:extLst>
+              <a:ext uri="{FF2B5EF4-FFF2-40B4-BE49-F238E27FC236}">
+                <a16:creationId xmlns:a16="http://schemas.microsoft.com/office/drawing/2014/main" id="{4693C19A-DDF9-438D-A19B-4B14DD418721}"/>
+              </a:ext>
+            </a:extLst>
+          </p:cNvPr>
+          <p:cNvSpPr>
+            <a:spLocks noGrp="1"/>
+          </p:cNvSpPr>
+          <p:nvPr>
+            <p:ph idx="1"/>
+          </p:nvPr>
+        </p:nvSpPr>
+        <p:spPr/>
+        <p:txBody>
+          <a:bodyPr/>
+          <a:lstStyle/>
+          <a:p>
+            <a:endParaRPr lang="en-US" dirty="0"/>
+          </a:p>
+        </p:txBody>
+      </p:sp>
+    </p:spTree>
+    <p:extLst>
+      <p:ext uri="{BB962C8B-B14F-4D97-AF65-F5344CB8AC3E}">
+        <p14:creationId xmlns:p14="http://schemas.microsoft.com/office/powerpoint/2010/main" val="518247939"/>
+      </p:ext>
+    </p:extLst>
+  </p:cSld>
+  <p:clrMapOvr>
+    <a:masterClrMapping/>
+  </p:clrMapOvr>
+  <mc:AlternateContent xmlns:mc="http://schemas.openxmlformats.org/markup-compatibility/2006" xmlns:p159="http://schemas.microsoft.com/office/powerpoint/2015/09/main">
+    <mc:Choice Requires="p159">
+      <p:transition xmlns:p14="http://schemas.microsoft.com/office/powerpoint/2010/main" spd="slow" p14:dur="2000">
+        <p159:morph option="byObject"/>
+      </p:transition>
+    </mc:Choice>
+    <mc:Fallback xmlns="">
+      <p:transition spd="slow">
+        <p:fade/>
+      </p:transition>
+    </mc:Fallback>
+  </mc:AlternateContent>
+</p:sld>
+</file>
+
+<file path=ppt/slides/slide18.xml><?xml version="1.0" encoding="utf-8"?>
+<p:sld xmlns:a="http://schemas.openxmlformats.org/drawingml/2006/main" xmlns:r="http://schemas.openxmlformats.org/officeDocument/2006/relationships" xmlns:p="http://schemas.openxmlformats.org/presentationml/2006/main">
+  <p:cSld>
+    <p:spTree>
+      <p:nvGrpSpPr>
+        <p:cNvPr id="1" name=""/>
+        <p:cNvGrpSpPr/>
+        <p:nvPr/>
+      </p:nvGrpSpPr>
+      <p:grpSpPr>
+        <a:xfrm>
+          <a:off x="0" y="0"/>
+          <a:ext cx="0" cy="0"/>
+          <a:chOff x="0" y="0"/>
+          <a:chExt cx="0" cy="0"/>
+        </a:xfrm>
+      </p:grpSpPr>
+      <p:sp>
+        <p:nvSpPr>
           <p:cNvPr id="2" name="Title 1">
             <a:extLst>
               <a:ext uri="{FF2B5EF4-FFF2-40B4-BE49-F238E27FC236}">
@@ -9453,13 +8997,13 @@
   <p:clrMapOvr>
     <a:masterClrMapping/>
   </p:clrMapOvr>
-  <mc:AlternateContent xmlns:mc="http://schemas.openxmlformats.org/markup-compatibility/2006">
-    <mc:Choice xmlns:p159="http://schemas.microsoft.com/office/powerpoint/2015/09/main" Requires="p159">
+  <mc:AlternateContent xmlns:mc="http://schemas.openxmlformats.org/markup-compatibility/2006" xmlns:p159="http://schemas.microsoft.com/office/powerpoint/2015/09/main">
+    <mc:Choice Requires="p159">
       <p:transition xmlns:p14="http://schemas.microsoft.com/office/powerpoint/2010/main" spd="slow" p14:dur="2000">
         <p159:morph option="byObject"/>
       </p:transition>
     </mc:Choice>
-    <mc:Fallback>
+    <mc:Fallback xmlns="">
       <p:transition spd="slow">
         <p:fade/>
       </p:transition>
@@ -9620,13 +9164,13 @@
   <p:clrMapOvr>
     <a:masterClrMapping/>
   </p:clrMapOvr>
-  <mc:AlternateContent xmlns:mc="http://schemas.openxmlformats.org/markup-compatibility/2006">
-    <mc:Choice xmlns:p159="http://schemas.microsoft.com/office/powerpoint/2015/09/main" Requires="p159">
+  <mc:AlternateContent xmlns:mc="http://schemas.openxmlformats.org/markup-compatibility/2006" xmlns:p159="http://schemas.microsoft.com/office/powerpoint/2015/09/main">
+    <mc:Choice Requires="p159">
       <p:transition xmlns:p14="http://schemas.microsoft.com/office/powerpoint/2010/main" spd="slow" p14:dur="2000">
         <p159:morph option="byObject"/>
       </p:transition>
     </mc:Choice>
-    <mc:Fallback>
+    <mc:Fallback xmlns="">
       <p:transition spd="slow">
         <p:fade/>
       </p:transition>
@@ -9873,6 +9417,58 @@
           </a:p>
         </p:txBody>
       </p:sp>
+      <p:sp>
+        <p:nvSpPr>
+          <p:cNvPr id="3" name="Rectangle 2">
+            <a:extLst>
+              <a:ext uri="{FF2B5EF4-FFF2-40B4-BE49-F238E27FC236}">
+                <a16:creationId xmlns:a16="http://schemas.microsoft.com/office/drawing/2014/main" id="{C2DD31CA-0541-4E57-B038-7930A68BFE75}"/>
+              </a:ext>
+            </a:extLst>
+          </p:cNvPr>
+          <p:cNvSpPr/>
+          <p:nvPr/>
+        </p:nvSpPr>
+        <p:spPr>
+          <a:xfrm>
+            <a:off x="8031480" y="1610360"/>
+            <a:ext cx="2799080" cy="1503680"/>
+          </a:xfrm>
+          <a:prstGeom prst="rect">
+            <a:avLst/>
+          </a:prstGeom>
+          <a:noFill/>
+          <a:ln w="76200">
+            <a:solidFill>
+              <a:srgbClr val="FF0000"/>
+            </a:solidFill>
+          </a:ln>
+        </p:spPr>
+        <p:style>
+          <a:lnRef idx="2">
+            <a:schemeClr val="accent1">
+              <a:shade val="50000"/>
+            </a:schemeClr>
+          </a:lnRef>
+          <a:fillRef idx="1">
+            <a:schemeClr val="accent1"/>
+          </a:fillRef>
+          <a:effectRef idx="0">
+            <a:schemeClr val="accent1"/>
+          </a:effectRef>
+          <a:fontRef idx="minor">
+            <a:schemeClr val="lt1"/>
+          </a:fontRef>
+        </p:style>
+        <p:txBody>
+          <a:bodyPr rtlCol="0" anchor="ctr"/>
+          <a:lstStyle/>
+          <a:p>
+            <a:pPr algn="ctr"/>
+            <a:endParaRPr lang="en-US"/>
+          </a:p>
+        </p:txBody>
+      </p:sp>
     </p:spTree>
     <p:extLst>
       <p:ext uri="{BB962C8B-B14F-4D97-AF65-F5344CB8AC3E}">
@@ -9883,13 +9479,13 @@
   <p:clrMapOvr>
     <a:masterClrMapping/>
   </p:clrMapOvr>
-  <mc:AlternateContent xmlns:mc="http://schemas.openxmlformats.org/markup-compatibility/2006">
-    <mc:Choice xmlns:p159="http://schemas.microsoft.com/office/powerpoint/2015/09/main" Requires="p159">
+  <mc:AlternateContent xmlns:mc="http://schemas.openxmlformats.org/markup-compatibility/2006" xmlns:p159="http://schemas.microsoft.com/office/powerpoint/2015/09/main">
+    <mc:Choice Requires="p159">
       <p:transition xmlns:p14="http://schemas.microsoft.com/office/powerpoint/2010/main" spd="slow" p14:dur="2000">
         <p159:morph option="byObject"/>
       </p:transition>
     </mc:Choice>
-    <mc:Fallback>
+    <mc:Fallback xmlns="">
       <p:transition spd="slow">
         <p:fade/>
       </p:transition>
@@ -9995,13 +9591,13 @@
   <p:clrMapOvr>
     <a:masterClrMapping/>
   </p:clrMapOvr>
-  <mc:AlternateContent xmlns:mc="http://schemas.openxmlformats.org/markup-compatibility/2006">
-    <mc:Choice xmlns:p159="http://schemas.microsoft.com/office/powerpoint/2015/09/main" Requires="p159">
+  <mc:AlternateContent xmlns:mc="http://schemas.openxmlformats.org/markup-compatibility/2006" xmlns:p159="http://schemas.microsoft.com/office/powerpoint/2015/09/main">
+    <mc:Choice Requires="p159">
       <p:transition xmlns:p14="http://schemas.microsoft.com/office/powerpoint/2010/main" spd="slow" p14:dur="2000">
         <p159:morph option="byObject"/>
       </p:transition>
     </mc:Choice>
-    <mc:Fallback>
+    <mc:Fallback xmlns="">
       <p:transition spd="slow">
         <p:fade/>
       </p:transition>
@@ -11778,13 +11374,13 @@
   <p:clrMapOvr>
     <a:masterClrMapping/>
   </p:clrMapOvr>
-  <mc:AlternateContent xmlns:mc="http://schemas.openxmlformats.org/markup-compatibility/2006">
-    <mc:Choice xmlns:p159="http://schemas.microsoft.com/office/powerpoint/2015/09/main" Requires="p159">
+  <mc:AlternateContent xmlns:mc="http://schemas.openxmlformats.org/markup-compatibility/2006" xmlns:p159="http://schemas.microsoft.com/office/powerpoint/2015/09/main">
+    <mc:Choice Requires="p159">
       <p:transition xmlns:p14="http://schemas.microsoft.com/office/powerpoint/2010/main" spd="slow" p14:dur="2000">
         <p159:morph option="byObject"/>
       </p:transition>
     </mc:Choice>
-    <mc:Fallback>
+    <mc:Fallback xmlns="">
       <p:transition spd="slow">
         <p:fade/>
       </p:transition>
@@ -11889,13 +11485,13 @@
   <p:clrMapOvr>
     <a:masterClrMapping/>
   </p:clrMapOvr>
-  <mc:AlternateContent xmlns:mc="http://schemas.openxmlformats.org/markup-compatibility/2006">
-    <mc:Choice xmlns:p159="http://schemas.microsoft.com/office/powerpoint/2015/09/main" Requires="p159">
+  <mc:AlternateContent xmlns:mc="http://schemas.openxmlformats.org/markup-compatibility/2006" xmlns:p159="http://schemas.microsoft.com/office/powerpoint/2015/09/main">
+    <mc:Choice Requires="p159">
       <p:transition xmlns:p14="http://schemas.microsoft.com/office/powerpoint/2010/main" spd="slow" p14:dur="2000">
         <p159:morph option="byObject"/>
       </p:transition>
     </mc:Choice>
-    <mc:Fallback>
+    <mc:Fallback xmlns="">
       <p:transition spd="slow">
         <p:fade/>
       </p:transition>
@@ -12292,13 +11888,13 @@
   <p:clrMapOvr>
     <a:masterClrMapping/>
   </p:clrMapOvr>
-  <mc:AlternateContent xmlns:mc="http://schemas.openxmlformats.org/markup-compatibility/2006">
-    <mc:Choice xmlns:p159="http://schemas.microsoft.com/office/powerpoint/2015/09/main" Requires="p159">
+  <mc:AlternateContent xmlns:mc="http://schemas.openxmlformats.org/markup-compatibility/2006" xmlns:p159="http://schemas.microsoft.com/office/powerpoint/2015/09/main">
+    <mc:Choice Requires="p159">
       <p:transition xmlns:p14="http://schemas.microsoft.com/office/powerpoint/2010/main" spd="slow" p14:dur="2000">
         <p159:morph option="byObject"/>
       </p:transition>
     </mc:Choice>
-    <mc:Fallback>
+    <mc:Fallback xmlns="">
       <p:transition spd="slow">
         <p:fade/>
       </p:transition>
@@ -14273,13 +13869,13 @@
   <p:clrMapOvr>
     <a:masterClrMapping/>
   </p:clrMapOvr>
-  <mc:AlternateContent xmlns:mc="http://schemas.openxmlformats.org/markup-compatibility/2006">
-    <mc:Choice xmlns:p159="http://schemas.microsoft.com/office/powerpoint/2015/09/main" Requires="p159">
+  <mc:AlternateContent xmlns:mc="http://schemas.openxmlformats.org/markup-compatibility/2006" xmlns:p159="http://schemas.microsoft.com/office/powerpoint/2015/09/main">
+    <mc:Choice Requires="p159">
       <p:transition xmlns:p14="http://schemas.microsoft.com/office/powerpoint/2010/main" spd="slow" p14:dur="2000">
         <p159:morph option="byObject"/>
       </p:transition>
     </mc:Choice>
-    <mc:Fallback>
+    <mc:Fallback xmlns="">
       <p:transition spd="slow">
         <p:fade/>
       </p:transition>
@@ -14433,13 +14029,13 @@
   <p:clrMapOvr>
     <a:masterClrMapping/>
   </p:clrMapOvr>
-  <mc:AlternateContent xmlns:mc="http://schemas.openxmlformats.org/markup-compatibility/2006">
-    <mc:Choice xmlns:p159="http://schemas.microsoft.com/office/powerpoint/2015/09/main" Requires="p159">
+  <mc:AlternateContent xmlns:mc="http://schemas.openxmlformats.org/markup-compatibility/2006" xmlns:p159="http://schemas.microsoft.com/office/powerpoint/2015/09/main">
+    <mc:Choice Requires="p159">
       <p:transition xmlns:p14="http://schemas.microsoft.com/office/powerpoint/2010/main" spd="slow" p14:dur="2000">
         <p159:morph option="byObject"/>
       </p:transition>
     </mc:Choice>
-    <mc:Fallback>
+    <mc:Fallback xmlns="">
       <p:transition spd="slow">
         <p:fade/>
       </p:transition>

</xml_diff>